<commit_message>
Closing slides (still todo)
</commit_message>
<xml_diff>
--- a/slides/closing.pptx
+++ b/slides/closing.pptx
@@ -5,20 +5,26 @@
     <p:sldMasterId id="2147483660" r:id="rId1"/>
   </p:sldMasterIdLst>
   <p:notesMasterIdLst>
-    <p:notesMasterId r:id="rId13"/>
+    <p:notesMasterId r:id="rId19"/>
   </p:notesMasterIdLst>
   <p:sldIdLst>
     <p:sldId id="258" r:id="rId2"/>
     <p:sldId id="263" r:id="rId3"/>
-    <p:sldId id="264" r:id="rId4"/>
-    <p:sldId id="265" r:id="rId5"/>
-    <p:sldId id="266" r:id="rId6"/>
-    <p:sldId id="267" r:id="rId7"/>
-    <p:sldId id="268" r:id="rId8"/>
-    <p:sldId id="269" r:id="rId9"/>
-    <p:sldId id="270" r:id="rId10"/>
-    <p:sldId id="271" r:id="rId11"/>
-    <p:sldId id="272" r:id="rId12"/>
+    <p:sldId id="265" r:id="rId4"/>
+    <p:sldId id="274" r:id="rId5"/>
+    <p:sldId id="275" r:id="rId6"/>
+    <p:sldId id="280" r:id="rId7"/>
+    <p:sldId id="266" r:id="rId8"/>
+    <p:sldId id="273" r:id="rId9"/>
+    <p:sldId id="276" r:id="rId10"/>
+    <p:sldId id="277" r:id="rId11"/>
+    <p:sldId id="278" r:id="rId12"/>
+    <p:sldId id="267" r:id="rId13"/>
+    <p:sldId id="268" r:id="rId14"/>
+    <p:sldId id="269" r:id="rId15"/>
+    <p:sldId id="270" r:id="rId16"/>
+    <p:sldId id="271" r:id="rId17"/>
+    <p:sldId id="272" r:id="rId18"/>
   </p:sldIdLst>
   <p:sldSz cx="9144000" cy="6858000" type="screen4x3"/>
   <p:notesSz cx="6858000" cy="9144000"/>
@@ -119,7 +125,7 @@
   </p:defaultTextStyle>
   <p:extLst>
     <p:ext uri="{EFAFB233-063F-42B5-8137-9DF3F51BA10A}">
-      <p15:sldGuideLst xmlns:p15="http://schemas.microsoft.com/office/powerpoint/2012/main" xmlns="">
+      <p15:sldGuideLst xmlns="" xmlns:p15="http://schemas.microsoft.com/office/powerpoint/2012/main">
         <p15:guide id="1" orient="horz" pos="2160">
           <p15:clr>
             <a:srgbClr val="A4A3A4"/>
@@ -484,6 +490,93 @@
     </a:lvl9pPr>
   </p:notesStyle>
 </p:notesMaster>
+</file>
+
+<file path=ppt/notesSlides/notesSlide1.xml><?xml version="1.0" encoding="utf-8"?>
+<p:notes xmlns:a="http://schemas.openxmlformats.org/drawingml/2006/main" xmlns:r="http://schemas.openxmlformats.org/officeDocument/2006/relationships" xmlns:p="http://schemas.openxmlformats.org/presentationml/2006/main">
+  <p:cSld>
+    <p:spTree>
+      <p:nvGrpSpPr>
+        <p:cNvPr id="1" name=""/>
+        <p:cNvGrpSpPr/>
+        <p:nvPr/>
+      </p:nvGrpSpPr>
+      <p:grpSpPr>
+        <a:xfrm>
+          <a:off x="0" y="0"/>
+          <a:ext cx="0" cy="0"/>
+          <a:chOff x="0" y="0"/>
+          <a:chExt cx="0" cy="0"/>
+        </a:xfrm>
+      </p:grpSpPr>
+      <p:sp>
+        <p:nvSpPr>
+          <p:cNvPr id="2" name="Slide Image Placeholder 1"/>
+          <p:cNvSpPr>
+            <a:spLocks noGrp="1" noRot="1" noChangeAspect="1"/>
+          </p:cNvSpPr>
+          <p:nvPr>
+            <p:ph type="sldImg"/>
+          </p:nvPr>
+        </p:nvSpPr>
+        <p:spPr/>
+      </p:sp>
+      <p:sp>
+        <p:nvSpPr>
+          <p:cNvPr id="3" name="Notes Placeholder 2"/>
+          <p:cNvSpPr>
+            <a:spLocks noGrp="1"/>
+          </p:cNvSpPr>
+          <p:nvPr>
+            <p:ph type="body" idx="1"/>
+          </p:nvPr>
+        </p:nvSpPr>
+        <p:spPr/>
+        <p:txBody>
+          <a:bodyPr/>
+          <a:lstStyle/>
+          <a:p>
+            <a:pPr marL="0" indent="0">
+              <a:buNone/>
+            </a:pPr>
+            <a:endParaRPr lang="en-US" baseline="0" dirty="0" smtClean="0"/>
+          </a:p>
+        </p:txBody>
+      </p:sp>
+      <p:sp>
+        <p:nvSpPr>
+          <p:cNvPr id="4" name="Slide Number Placeholder 3"/>
+          <p:cNvSpPr>
+            <a:spLocks noGrp="1"/>
+          </p:cNvSpPr>
+          <p:nvPr>
+            <p:ph type="sldNum" sz="quarter" idx="10"/>
+          </p:nvPr>
+        </p:nvSpPr>
+        <p:spPr/>
+        <p:txBody>
+          <a:bodyPr/>
+          <a:lstStyle/>
+          <a:p>
+            <a:fld id="{2F62458E-D3E8-174F-8467-44D405B74BFF}" type="slidenum">
+              <a:rPr lang="en-US" smtClean="0"/>
+              <a:t>5</a:t>
+            </a:fld>
+            <a:endParaRPr lang="en-US" dirty="0"/>
+          </a:p>
+        </p:txBody>
+      </p:sp>
+    </p:spTree>
+    <p:extLst>
+      <p:ext uri="{BB962C8B-B14F-4D97-AF65-F5344CB8AC3E}">
+        <p14:creationId xmlns:p14="http://schemas.microsoft.com/office/powerpoint/2010/main" val="1746332212"/>
+      </p:ext>
+    </p:extLst>
+  </p:cSld>
+  <p:clrMapOvr>
+    <a:masterClrMapping/>
+  </p:clrMapOvr>
+</p:notes>
 </file>
 
 <file path=ppt/slideLayouts/slideLayout1.xml><?xml version="1.0" encoding="utf-8"?>
@@ -4091,8 +4184,8 @@
           <a:lstStyle/>
           <a:p>
             <a:r>
-              <a:rPr lang="en-US" dirty="0" smtClean="0"/>
-              <a:t>What’s coming next for Flink?</a:t>
+              <a:rPr lang="en-US" dirty="0" err="1" smtClean="0"/>
+              <a:t>FlinkML</a:t>
             </a:r>
             <a:endParaRPr lang="en-US" dirty="0"/>
           </a:p>
@@ -4100,20 +4193,88 @@
       </p:sp>
       <p:sp>
         <p:nvSpPr>
-          <p:cNvPr id="6" name="Text Placeholder 5"/>
-          <p:cNvSpPr>
-            <a:spLocks noGrp="1"/>
-          </p:cNvSpPr>
-          <p:nvPr>
-            <p:ph type="body" idx="1"/>
+          <p:cNvPr id="6" name="Content Placeholder 5"/>
+          <p:cNvSpPr>
+            <a:spLocks noGrp="1"/>
+          </p:cNvSpPr>
+          <p:nvPr>
+            <p:ph idx="1"/>
           </p:nvPr>
         </p:nvSpPr>
         <p:spPr/>
         <p:txBody>
-          <a:bodyPr/>
-          <a:lstStyle/>
-          <a:p>
-            <a:endParaRPr lang="en-US"/>
+          <a:bodyPr>
+            <a:normAutofit lnSpcReduction="10000"/>
+          </a:bodyPr>
+          <a:lstStyle/>
+          <a:p>
+            <a:r>
+              <a:rPr lang="en-US" dirty="0" smtClean="0"/>
+              <a:t>API and library for Machine Learning</a:t>
+            </a:r>
+          </a:p>
+          <a:p>
+            <a:pPr lvl="1"/>
+            <a:r>
+              <a:rPr lang="en-US" dirty="0" smtClean="0"/>
+              <a:t>ML pipelines inspired by </a:t>
+            </a:r>
+            <a:r>
+              <a:rPr lang="en-US" dirty="0" err="1" smtClean="0"/>
+              <a:t>SciKitLearn</a:t>
+            </a:r>
+            <a:endParaRPr lang="en-US" dirty="0" smtClean="0"/>
+          </a:p>
+          <a:p>
+            <a:pPr lvl="1"/>
+            <a:endParaRPr lang="en-US" dirty="0" smtClean="0"/>
+          </a:p>
+          <a:p>
+            <a:r>
+              <a:rPr lang="en-US" dirty="0" smtClean="0"/>
+              <a:t>Comes with</a:t>
+            </a:r>
+          </a:p>
+          <a:p>
+            <a:pPr lvl="1"/>
+            <a:r>
+              <a:rPr lang="en-US" dirty="0" smtClean="0"/>
+              <a:t>Optimizers</a:t>
+            </a:r>
+          </a:p>
+          <a:p>
+            <a:pPr lvl="1"/>
+            <a:r>
+              <a:rPr lang="en-US" dirty="0" smtClean="0"/>
+              <a:t>Cross Validation</a:t>
+            </a:r>
+          </a:p>
+          <a:p>
+            <a:pPr lvl="1"/>
+            <a:r>
+              <a:rPr lang="en-US" dirty="0" smtClean="0">
+                <a:solidFill>
+                  <a:srgbClr val="FF0000"/>
+                </a:solidFill>
+              </a:rPr>
+              <a:t>… (TILL)</a:t>
+            </a:r>
+            <a:endParaRPr lang="en-US" dirty="0" smtClean="0">
+              <a:solidFill>
+                <a:srgbClr val="FF0000"/>
+              </a:solidFill>
+            </a:endParaRPr>
+          </a:p>
+          <a:p>
+            <a:pPr lvl="1"/>
+            <a:endParaRPr lang="en-US" dirty="0"/>
+          </a:p>
+          <a:p>
+            <a:r>
+              <a:rPr lang="en-US" dirty="0" smtClean="0"/>
+              <a:t>Rapidly evolving</a:t>
+            </a:r>
+            <a:endParaRPr lang="en-US" dirty="0"/>
           </a:p>
         </p:txBody>
       </p:sp>
@@ -4133,30 +4294,18 @@
           <a:lstStyle/>
           <a:p>
             <a:fld id="{B07C5D84-2227-C144-B485-A8CA33CE4230}" type="slidenum">
-              <a:rPr lang="en-US" smtClean="0">
-                <a:solidFill>
-                  <a:prstClr val="black">
-                    <a:tint val="75000"/>
-                  </a:prstClr>
-                </a:solidFill>
-              </a:rPr>
+              <a:rPr lang="en-US" smtClean="0"/>
               <a:pPr/>
               <a:t>10</a:t>
             </a:fld>
-            <a:endParaRPr lang="en-US">
-              <a:solidFill>
-                <a:prstClr val="black">
-                  <a:tint val="75000"/>
-                </a:prstClr>
-              </a:solidFill>
-            </a:endParaRPr>
+            <a:endParaRPr lang="en-US"/>
           </a:p>
         </p:txBody>
       </p:sp>
     </p:spTree>
     <p:extLst>
       <p:ext uri="{BB962C8B-B14F-4D97-AF65-F5344CB8AC3E}">
-        <p14:creationId xmlns:p14="http://schemas.microsoft.com/office/powerpoint/2010/main" val="1733135436"/>
+        <p14:creationId xmlns:p14="http://schemas.microsoft.com/office/powerpoint/2010/main" val="3512507345"/>
       </p:ext>
     </p:extLst>
   </p:cSld>
@@ -4185,7 +4334,7 @@
       </p:grpSpPr>
       <p:sp>
         <p:nvSpPr>
-          <p:cNvPr id="2" name="Title 1"/>
+          <p:cNvPr id="5" name="Title 4"/>
           <p:cNvSpPr>
             <a:spLocks noGrp="1"/>
           </p:cNvSpPr>
@@ -4198,13 +4347,25 @@
           <a:bodyPr/>
           <a:lstStyle/>
           <a:p>
-            <a:endParaRPr lang="en-US"/>
-          </a:p>
-        </p:txBody>
-      </p:sp>
-      <p:sp>
-        <p:nvSpPr>
-          <p:cNvPr id="3" name="Content Placeholder 2"/>
+            <a:r>
+              <a:rPr lang="en-US" dirty="0" smtClean="0"/>
+              <a:t>Python </a:t>
+            </a:r>
+            <a:r>
+              <a:rPr lang="en-US" dirty="0" err="1" smtClean="0"/>
+              <a:t>DataSet</a:t>
+            </a:r>
+            <a:r>
+              <a:rPr lang="en-US" dirty="0" smtClean="0"/>
+              <a:t> API</a:t>
+            </a:r>
+            <a:endParaRPr lang="en-US" dirty="0"/>
+          </a:p>
+        </p:txBody>
+      </p:sp>
+      <p:sp>
+        <p:nvSpPr>
+          <p:cNvPr id="6" name="Content Placeholder 5"/>
           <p:cNvSpPr>
             <a:spLocks noGrp="1"/>
           </p:cNvSpPr>
@@ -4221,76 +4382,171 @@
           <a:p>
             <a:r>
               <a:rPr lang="en-US" dirty="0" smtClean="0"/>
-              <a:t>Release 0.9</a:t>
-            </a:r>
-          </a:p>
-          <a:p>
-            <a:r>
-              <a:rPr lang="en-US" dirty="0" smtClean="0"/>
-              <a:t>Streaming stuff</a:t>
+              <a:t>Write </a:t>
+            </a:r>
+            <a:r>
+              <a:rPr lang="en-US" dirty="0" err="1" smtClean="0"/>
+              <a:t>DataSet</a:t>
+            </a:r>
+            <a:r>
+              <a:rPr lang="en-US" dirty="0" smtClean="0"/>
+              <a:t> batch programs in Python</a:t>
             </a:r>
           </a:p>
           <a:p>
             <a:pPr lvl="1"/>
-            <a:r>
-              <a:rPr lang="en-US" dirty="0" smtClean="0"/>
-              <a:t>True streaming</a:t>
+            <a:endParaRPr lang="en-US" dirty="0" smtClean="0"/>
+          </a:p>
+          <a:p>
+            <a:r>
+              <a:rPr lang="en-US" dirty="0" smtClean="0"/>
+              <a:t>Runs on </a:t>
+            </a:r>
+            <a:r>
+              <a:rPr lang="en-US" dirty="0" err="1" smtClean="0"/>
+              <a:t>Flink’s</a:t>
+            </a:r>
+            <a:r>
+              <a:rPr lang="en-US" dirty="0" smtClean="0"/>
+              <a:t> robust runtime</a:t>
             </a:r>
           </a:p>
           <a:p>
             <a:pPr lvl="1"/>
             <a:r>
               <a:rPr lang="en-US" dirty="0" smtClean="0"/>
-              <a:t>Exactly once with low overhead</a:t>
+              <a:t>Memory-safe execution</a:t>
             </a:r>
           </a:p>
           <a:p>
             <a:pPr lvl="1"/>
             <a:r>
               <a:rPr lang="en-US" dirty="0" smtClean="0"/>
-              <a:t>High-level programming abstractions w/ flexible windows</a:t>
-            </a:r>
-          </a:p>
-          <a:p>
-            <a:r>
-              <a:rPr lang="en-US" dirty="0" smtClean="0"/>
-              <a:t>APIs + Libraries</a:t>
+              <a:t>Out-of-core algorithms</a:t>
             </a:r>
           </a:p>
           <a:p>
             <a:pPr lvl="1"/>
-            <a:r>
-              <a:rPr lang="en-US" dirty="0" err="1" smtClean="0"/>
-              <a:t>Gelly</a:t>
-            </a:r>
-            <a:endParaRPr lang="en-US" dirty="0" smtClean="0"/>
+            <a:endParaRPr lang="en-US" dirty="0"/>
+          </a:p>
+          <a:p>
+            <a:r>
+              <a:rPr lang="en-US" dirty="0" smtClean="0"/>
+              <a:t>Data is handed to Python functions</a:t>
+            </a:r>
           </a:p>
           <a:p>
             <a:pPr lvl="1"/>
             <a:r>
-              <a:rPr lang="en-US" dirty="0" err="1" smtClean="0"/>
-              <a:t>FlinkML</a:t>
-            </a:r>
-            <a:endParaRPr lang="en-US" dirty="0" smtClean="0"/>
-          </a:p>
-          <a:p>
-            <a:pPr lvl="1"/>
-            <a:r>
-              <a:rPr lang="en-US" dirty="0" err="1" smtClean="0"/>
-              <a:t>TableAPI</a:t>
-            </a:r>
-            <a:r>
-              <a:rPr lang="en-US" dirty="0" smtClean="0"/>
-              <a:t> + SQL</a:t>
-            </a:r>
+              <a:rPr lang="en-US" dirty="0" smtClean="0"/>
+              <a:t>Similar to Hadoop Streaming</a:t>
+            </a:r>
+          </a:p>
+          <a:p>
             <a:endParaRPr lang="en-US" dirty="0"/>
           </a:p>
           <a:p>
             <a:r>
               <a:rPr lang="en-US" dirty="0" smtClean="0"/>
-              <a:t>Strongly growing community</a:t>
+              <a:t>Still in early stage</a:t>
             </a:r>
             <a:endParaRPr lang="en-US" dirty="0"/>
+          </a:p>
+        </p:txBody>
+      </p:sp>
+      <p:sp>
+        <p:nvSpPr>
+          <p:cNvPr id="4" name="Slide Number Placeholder 3"/>
+          <p:cNvSpPr>
+            <a:spLocks noGrp="1"/>
+          </p:cNvSpPr>
+          <p:nvPr>
+            <p:ph type="sldNum" sz="quarter" idx="12"/>
+          </p:nvPr>
+        </p:nvSpPr>
+        <p:spPr/>
+        <p:txBody>
+          <a:bodyPr/>
+          <a:lstStyle/>
+          <a:p>
+            <a:fld id="{B07C5D84-2227-C144-B485-A8CA33CE4230}" type="slidenum">
+              <a:rPr lang="en-US" smtClean="0"/>
+              <a:pPr/>
+              <a:t>11</a:t>
+            </a:fld>
+            <a:endParaRPr lang="en-US"/>
+          </a:p>
+        </p:txBody>
+      </p:sp>
+    </p:spTree>
+    <p:extLst>
+      <p:ext uri="{BB962C8B-B14F-4D97-AF65-F5344CB8AC3E}">
+        <p14:creationId xmlns:p14="http://schemas.microsoft.com/office/powerpoint/2010/main" val="881555453"/>
+      </p:ext>
+    </p:extLst>
+  </p:cSld>
+  <p:clrMapOvr>
+    <a:masterClrMapping/>
+  </p:clrMapOvr>
+</p:sld>
+</file>
+
+<file path=ppt/slides/slide12.xml><?xml version="1.0" encoding="utf-8"?>
+<p:sld xmlns:a="http://schemas.openxmlformats.org/drawingml/2006/main" xmlns:r="http://schemas.openxmlformats.org/officeDocument/2006/relationships" xmlns:p="http://schemas.openxmlformats.org/presentationml/2006/main">
+  <p:cSld>
+    <p:spTree>
+      <p:nvGrpSpPr>
+        <p:cNvPr id="1" name=""/>
+        <p:cNvGrpSpPr/>
+        <p:nvPr/>
+      </p:nvGrpSpPr>
+      <p:grpSpPr>
+        <a:xfrm>
+          <a:off x="0" y="0"/>
+          <a:ext cx="0" cy="0"/>
+          <a:chOff x="0" y="0"/>
+          <a:chExt cx="0" cy="0"/>
+        </a:xfrm>
+      </p:grpSpPr>
+      <p:sp>
+        <p:nvSpPr>
+          <p:cNvPr id="5" name="Title 4"/>
+          <p:cNvSpPr>
+            <a:spLocks noGrp="1"/>
+          </p:cNvSpPr>
+          <p:nvPr>
+            <p:ph type="title"/>
+          </p:nvPr>
+        </p:nvSpPr>
+        <p:spPr/>
+        <p:txBody>
+          <a:bodyPr/>
+          <a:lstStyle/>
+          <a:p>
+            <a:r>
+              <a:rPr lang="en-US" dirty="0" smtClean="0"/>
+              <a:t>Interactive Data Analysis</a:t>
+            </a:r>
+            <a:endParaRPr lang="en-US" dirty="0"/>
+          </a:p>
+        </p:txBody>
+      </p:sp>
+      <p:sp>
+        <p:nvSpPr>
+          <p:cNvPr id="6" name="Text Placeholder 5"/>
+          <p:cNvSpPr>
+            <a:spLocks noGrp="1"/>
+          </p:cNvSpPr>
+          <p:nvPr>
+            <p:ph type="body" idx="1"/>
+          </p:nvPr>
+        </p:nvSpPr>
+        <p:spPr/>
+        <p:txBody>
+          <a:bodyPr/>
+          <a:lstStyle/>
+          <a:p>
+            <a:endParaRPr lang="en-US"/>
           </a:p>
         </p:txBody>
       </p:sp>
@@ -4318,7 +4574,624 @@
                 </a:solidFill>
               </a:rPr>
               <a:pPr/>
-              <a:t>11</a:t>
+              <a:t>12</a:t>
+            </a:fld>
+            <a:endParaRPr lang="en-US">
+              <a:solidFill>
+                <a:prstClr val="black">
+                  <a:tint val="75000"/>
+                </a:prstClr>
+              </a:solidFill>
+            </a:endParaRPr>
+          </a:p>
+        </p:txBody>
+      </p:sp>
+    </p:spTree>
+    <p:extLst>
+      <p:ext uri="{BB962C8B-B14F-4D97-AF65-F5344CB8AC3E}">
+        <p14:creationId xmlns:p14="http://schemas.microsoft.com/office/powerpoint/2010/main" val="367488533"/>
+      </p:ext>
+    </p:extLst>
+  </p:cSld>
+  <p:clrMapOvr>
+    <a:masterClrMapping/>
+  </p:clrMapOvr>
+</p:sld>
+</file>
+
+<file path=ppt/slides/slide13.xml><?xml version="1.0" encoding="utf-8"?>
+<p:sld xmlns:a="http://schemas.openxmlformats.org/drawingml/2006/main" xmlns:r="http://schemas.openxmlformats.org/officeDocument/2006/relationships" xmlns:p="http://schemas.openxmlformats.org/presentationml/2006/main">
+  <p:cSld>
+    <p:spTree>
+      <p:nvGrpSpPr>
+        <p:cNvPr id="1" name=""/>
+        <p:cNvGrpSpPr/>
+        <p:nvPr/>
+      </p:nvGrpSpPr>
+      <p:grpSpPr>
+        <a:xfrm>
+          <a:off x="0" y="0"/>
+          <a:ext cx="0" cy="0"/>
+          <a:chOff x="0" y="0"/>
+          <a:chExt cx="0" cy="0"/>
+        </a:xfrm>
+      </p:grpSpPr>
+      <p:sp>
+        <p:nvSpPr>
+          <p:cNvPr id="5" name="Title 4"/>
+          <p:cNvSpPr>
+            <a:spLocks noGrp="1"/>
+          </p:cNvSpPr>
+          <p:nvPr>
+            <p:ph type="title"/>
+          </p:nvPr>
+        </p:nvSpPr>
+        <p:spPr/>
+        <p:txBody>
+          <a:bodyPr/>
+          <a:lstStyle/>
+          <a:p>
+            <a:endParaRPr lang="en-US"/>
+          </a:p>
+        </p:txBody>
+      </p:sp>
+      <p:sp>
+        <p:nvSpPr>
+          <p:cNvPr id="6" name="Content Placeholder 5"/>
+          <p:cNvSpPr>
+            <a:spLocks noGrp="1"/>
+          </p:cNvSpPr>
+          <p:nvPr>
+            <p:ph idx="1"/>
+          </p:nvPr>
+        </p:nvSpPr>
+        <p:spPr/>
+        <p:txBody>
+          <a:bodyPr/>
+          <a:lstStyle/>
+          <a:p>
+            <a:r>
+              <a:rPr lang="en-US" dirty="0" smtClean="0"/>
+              <a:t>Apache Zeppelin</a:t>
+            </a:r>
+          </a:p>
+          <a:p>
+            <a:r>
+              <a:rPr lang="en-US" dirty="0" err="1" smtClean="0"/>
+              <a:t>Scala</a:t>
+            </a:r>
+            <a:r>
+              <a:rPr lang="en-US" dirty="0" smtClean="0"/>
+              <a:t> REPL</a:t>
+            </a:r>
+          </a:p>
+          <a:p>
+            <a:r>
+              <a:rPr lang="en-US" dirty="0" smtClean="0"/>
+              <a:t>Result caching (WIP)</a:t>
+            </a:r>
+            <a:endParaRPr lang="en-US" dirty="0"/>
+          </a:p>
+        </p:txBody>
+      </p:sp>
+      <p:sp>
+        <p:nvSpPr>
+          <p:cNvPr id="4" name="Slide Number Placeholder 3"/>
+          <p:cNvSpPr>
+            <a:spLocks noGrp="1"/>
+          </p:cNvSpPr>
+          <p:nvPr>
+            <p:ph type="sldNum" sz="quarter" idx="12"/>
+          </p:nvPr>
+        </p:nvSpPr>
+        <p:spPr/>
+        <p:txBody>
+          <a:bodyPr/>
+          <a:lstStyle/>
+          <a:p>
+            <a:fld id="{B07C5D84-2227-C144-B485-A8CA33CE4230}" type="slidenum">
+              <a:rPr lang="en-US" smtClean="0"/>
+              <a:pPr/>
+              <a:t>13</a:t>
+            </a:fld>
+            <a:endParaRPr lang="en-US"/>
+          </a:p>
+        </p:txBody>
+      </p:sp>
+    </p:spTree>
+    <p:extLst>
+      <p:ext uri="{BB962C8B-B14F-4D97-AF65-F5344CB8AC3E}">
+        <p14:creationId xmlns:p14="http://schemas.microsoft.com/office/powerpoint/2010/main" val="795095480"/>
+      </p:ext>
+    </p:extLst>
+  </p:cSld>
+  <p:clrMapOvr>
+    <a:masterClrMapping/>
+  </p:clrMapOvr>
+</p:sld>
+</file>
+
+<file path=ppt/slides/slide14.xml><?xml version="1.0" encoding="utf-8"?>
+<p:sld xmlns:a="http://schemas.openxmlformats.org/drawingml/2006/main" xmlns:r="http://schemas.openxmlformats.org/officeDocument/2006/relationships" xmlns:p="http://schemas.openxmlformats.org/presentationml/2006/main">
+  <p:cSld>
+    <p:spTree>
+      <p:nvGrpSpPr>
+        <p:cNvPr id="1" name=""/>
+        <p:cNvGrpSpPr/>
+        <p:nvPr/>
+      </p:nvGrpSpPr>
+      <p:grpSpPr>
+        <a:xfrm>
+          <a:off x="0" y="0"/>
+          <a:ext cx="0" cy="0"/>
+          <a:chOff x="0" y="0"/>
+          <a:chExt cx="0" cy="0"/>
+        </a:xfrm>
+      </p:grpSpPr>
+      <p:sp>
+        <p:nvSpPr>
+          <p:cNvPr id="5" name="Title 4"/>
+          <p:cNvSpPr>
+            <a:spLocks noGrp="1"/>
+          </p:cNvSpPr>
+          <p:nvPr>
+            <p:ph type="title"/>
+          </p:nvPr>
+        </p:nvSpPr>
+        <p:spPr/>
+        <p:txBody>
+          <a:bodyPr/>
+          <a:lstStyle/>
+          <a:p>
+            <a:r>
+              <a:rPr lang="en-US" dirty="0" smtClean="0"/>
+              <a:t>Distributed Setups</a:t>
+            </a:r>
+            <a:endParaRPr lang="en-US" dirty="0"/>
+          </a:p>
+        </p:txBody>
+      </p:sp>
+      <p:sp>
+        <p:nvSpPr>
+          <p:cNvPr id="6" name="Text Placeholder 5"/>
+          <p:cNvSpPr>
+            <a:spLocks noGrp="1"/>
+          </p:cNvSpPr>
+          <p:nvPr>
+            <p:ph type="body" idx="1"/>
+          </p:nvPr>
+        </p:nvSpPr>
+        <p:spPr/>
+        <p:txBody>
+          <a:bodyPr/>
+          <a:lstStyle/>
+          <a:p>
+            <a:endParaRPr lang="en-US"/>
+          </a:p>
+        </p:txBody>
+      </p:sp>
+      <p:sp>
+        <p:nvSpPr>
+          <p:cNvPr id="4" name="Slide Number Placeholder 3"/>
+          <p:cNvSpPr>
+            <a:spLocks noGrp="1"/>
+          </p:cNvSpPr>
+          <p:nvPr>
+            <p:ph type="sldNum" sz="quarter" idx="12"/>
+          </p:nvPr>
+        </p:nvSpPr>
+        <p:spPr/>
+        <p:txBody>
+          <a:bodyPr/>
+          <a:lstStyle/>
+          <a:p>
+            <a:fld id="{B07C5D84-2227-C144-B485-A8CA33CE4230}" type="slidenum">
+              <a:rPr lang="en-US" smtClean="0">
+                <a:solidFill>
+                  <a:prstClr val="black">
+                    <a:tint val="75000"/>
+                  </a:prstClr>
+                </a:solidFill>
+              </a:rPr>
+              <a:pPr/>
+              <a:t>14</a:t>
+            </a:fld>
+            <a:endParaRPr lang="en-US">
+              <a:solidFill>
+                <a:prstClr val="black">
+                  <a:tint val="75000"/>
+                </a:prstClr>
+              </a:solidFill>
+            </a:endParaRPr>
+          </a:p>
+        </p:txBody>
+      </p:sp>
+    </p:spTree>
+    <p:extLst>
+      <p:ext uri="{BB962C8B-B14F-4D97-AF65-F5344CB8AC3E}">
+        <p14:creationId xmlns:p14="http://schemas.microsoft.com/office/powerpoint/2010/main" val="1848857036"/>
+      </p:ext>
+    </p:extLst>
+  </p:cSld>
+  <p:clrMapOvr>
+    <a:masterClrMapping/>
+  </p:clrMapOvr>
+</p:sld>
+</file>
+
+<file path=ppt/slides/slide15.xml><?xml version="1.0" encoding="utf-8"?>
+<p:sld xmlns:a="http://schemas.openxmlformats.org/drawingml/2006/main" xmlns:r="http://schemas.openxmlformats.org/officeDocument/2006/relationships" xmlns:p="http://schemas.openxmlformats.org/presentationml/2006/main">
+  <p:cSld>
+    <p:spTree>
+      <p:nvGrpSpPr>
+        <p:cNvPr id="1" name=""/>
+        <p:cNvGrpSpPr/>
+        <p:nvPr/>
+      </p:nvGrpSpPr>
+      <p:grpSpPr>
+        <a:xfrm>
+          <a:off x="0" y="0"/>
+          <a:ext cx="0" cy="0"/>
+          <a:chOff x="0" y="0"/>
+          <a:chExt cx="0" cy="0"/>
+        </a:xfrm>
+      </p:grpSpPr>
+      <p:sp>
+        <p:nvSpPr>
+          <p:cNvPr id="5" name="Title 4"/>
+          <p:cNvSpPr>
+            <a:spLocks noGrp="1"/>
+          </p:cNvSpPr>
+          <p:nvPr>
+            <p:ph type="title"/>
+          </p:nvPr>
+        </p:nvSpPr>
+        <p:spPr/>
+        <p:txBody>
+          <a:bodyPr/>
+          <a:lstStyle/>
+          <a:p>
+            <a:endParaRPr lang="en-US"/>
+          </a:p>
+        </p:txBody>
+      </p:sp>
+      <p:sp>
+        <p:nvSpPr>
+          <p:cNvPr id="6" name="Content Placeholder 5"/>
+          <p:cNvSpPr>
+            <a:spLocks noGrp="1"/>
+          </p:cNvSpPr>
+          <p:nvPr>
+            <p:ph idx="1"/>
+          </p:nvPr>
+        </p:nvSpPr>
+        <p:spPr/>
+        <p:txBody>
+          <a:bodyPr/>
+          <a:lstStyle/>
+          <a:p>
+            <a:r>
+              <a:rPr lang="en-US" dirty="0" smtClean="0"/>
+              <a:t>Cluster</a:t>
+            </a:r>
+          </a:p>
+          <a:p>
+            <a:r>
+              <a:rPr lang="en-US" dirty="0" smtClean="0"/>
+              <a:t>YARN (incl. Amazon EMR)</a:t>
+            </a:r>
+          </a:p>
+          <a:p>
+            <a:r>
+              <a:rPr lang="en-US" dirty="0" err="1" smtClean="0"/>
+              <a:t>BDUtil</a:t>
+            </a:r>
+            <a:r>
+              <a:rPr lang="en-US" dirty="0" smtClean="0"/>
+              <a:t> for Google Cloud</a:t>
+            </a:r>
+            <a:endParaRPr lang="en-US" dirty="0"/>
+          </a:p>
+        </p:txBody>
+      </p:sp>
+      <p:sp>
+        <p:nvSpPr>
+          <p:cNvPr id="4" name="Slide Number Placeholder 3"/>
+          <p:cNvSpPr>
+            <a:spLocks noGrp="1"/>
+          </p:cNvSpPr>
+          <p:nvPr>
+            <p:ph type="sldNum" sz="quarter" idx="12"/>
+          </p:nvPr>
+        </p:nvSpPr>
+        <p:spPr/>
+        <p:txBody>
+          <a:bodyPr/>
+          <a:lstStyle/>
+          <a:p>
+            <a:fld id="{B07C5D84-2227-C144-B485-A8CA33CE4230}" type="slidenum">
+              <a:rPr lang="en-US" smtClean="0"/>
+              <a:pPr/>
+              <a:t>15</a:t>
+            </a:fld>
+            <a:endParaRPr lang="en-US"/>
+          </a:p>
+        </p:txBody>
+      </p:sp>
+    </p:spTree>
+    <p:extLst>
+      <p:ext uri="{BB962C8B-B14F-4D97-AF65-F5344CB8AC3E}">
+        <p14:creationId xmlns:p14="http://schemas.microsoft.com/office/powerpoint/2010/main" val="631382542"/>
+      </p:ext>
+    </p:extLst>
+  </p:cSld>
+  <p:clrMapOvr>
+    <a:masterClrMapping/>
+  </p:clrMapOvr>
+</p:sld>
+</file>
+
+<file path=ppt/slides/slide16.xml><?xml version="1.0" encoding="utf-8"?>
+<p:sld xmlns:a="http://schemas.openxmlformats.org/drawingml/2006/main" xmlns:r="http://schemas.openxmlformats.org/officeDocument/2006/relationships" xmlns:p="http://schemas.openxmlformats.org/presentationml/2006/main">
+  <p:cSld>
+    <p:spTree>
+      <p:nvGrpSpPr>
+        <p:cNvPr id="1" name=""/>
+        <p:cNvGrpSpPr/>
+        <p:nvPr/>
+      </p:nvGrpSpPr>
+      <p:grpSpPr>
+        <a:xfrm>
+          <a:off x="0" y="0"/>
+          <a:ext cx="0" cy="0"/>
+          <a:chOff x="0" y="0"/>
+          <a:chExt cx="0" cy="0"/>
+        </a:xfrm>
+      </p:grpSpPr>
+      <p:sp>
+        <p:nvSpPr>
+          <p:cNvPr id="5" name="Title 4"/>
+          <p:cNvSpPr>
+            <a:spLocks noGrp="1"/>
+          </p:cNvSpPr>
+          <p:nvPr>
+            <p:ph type="title"/>
+          </p:nvPr>
+        </p:nvSpPr>
+        <p:spPr/>
+        <p:txBody>
+          <a:bodyPr/>
+          <a:lstStyle/>
+          <a:p>
+            <a:r>
+              <a:rPr lang="en-US" dirty="0" smtClean="0"/>
+              <a:t>What’s coming next for Flink?</a:t>
+            </a:r>
+            <a:endParaRPr lang="en-US" dirty="0"/>
+          </a:p>
+        </p:txBody>
+      </p:sp>
+      <p:sp>
+        <p:nvSpPr>
+          <p:cNvPr id="6" name="Text Placeholder 5"/>
+          <p:cNvSpPr>
+            <a:spLocks noGrp="1"/>
+          </p:cNvSpPr>
+          <p:nvPr>
+            <p:ph type="body" idx="1"/>
+          </p:nvPr>
+        </p:nvSpPr>
+        <p:spPr/>
+        <p:txBody>
+          <a:bodyPr/>
+          <a:lstStyle/>
+          <a:p>
+            <a:endParaRPr lang="en-US"/>
+          </a:p>
+        </p:txBody>
+      </p:sp>
+      <p:sp>
+        <p:nvSpPr>
+          <p:cNvPr id="4" name="Slide Number Placeholder 3"/>
+          <p:cNvSpPr>
+            <a:spLocks noGrp="1"/>
+          </p:cNvSpPr>
+          <p:nvPr>
+            <p:ph type="sldNum" sz="quarter" idx="12"/>
+          </p:nvPr>
+        </p:nvSpPr>
+        <p:spPr/>
+        <p:txBody>
+          <a:bodyPr/>
+          <a:lstStyle/>
+          <a:p>
+            <a:fld id="{B07C5D84-2227-C144-B485-A8CA33CE4230}" type="slidenum">
+              <a:rPr lang="en-US" smtClean="0">
+                <a:solidFill>
+                  <a:prstClr val="black">
+                    <a:tint val="75000"/>
+                  </a:prstClr>
+                </a:solidFill>
+              </a:rPr>
+              <a:pPr/>
+              <a:t>16</a:t>
+            </a:fld>
+            <a:endParaRPr lang="en-US">
+              <a:solidFill>
+                <a:prstClr val="black">
+                  <a:tint val="75000"/>
+                </a:prstClr>
+              </a:solidFill>
+            </a:endParaRPr>
+          </a:p>
+        </p:txBody>
+      </p:sp>
+    </p:spTree>
+    <p:extLst>
+      <p:ext uri="{BB962C8B-B14F-4D97-AF65-F5344CB8AC3E}">
+        <p14:creationId xmlns:p14="http://schemas.microsoft.com/office/powerpoint/2010/main" val="1733135436"/>
+      </p:ext>
+    </p:extLst>
+  </p:cSld>
+  <p:clrMapOvr>
+    <a:masterClrMapping/>
+  </p:clrMapOvr>
+</p:sld>
+</file>
+
+<file path=ppt/slides/slide17.xml><?xml version="1.0" encoding="utf-8"?>
+<p:sld xmlns:a="http://schemas.openxmlformats.org/drawingml/2006/main" xmlns:r="http://schemas.openxmlformats.org/officeDocument/2006/relationships" xmlns:p="http://schemas.openxmlformats.org/presentationml/2006/main">
+  <p:cSld>
+    <p:spTree>
+      <p:nvGrpSpPr>
+        <p:cNvPr id="1" name=""/>
+        <p:cNvGrpSpPr/>
+        <p:nvPr/>
+      </p:nvGrpSpPr>
+      <p:grpSpPr>
+        <a:xfrm>
+          <a:off x="0" y="0"/>
+          <a:ext cx="0" cy="0"/>
+          <a:chOff x="0" y="0"/>
+          <a:chExt cx="0" cy="0"/>
+        </a:xfrm>
+      </p:grpSpPr>
+      <p:sp>
+        <p:nvSpPr>
+          <p:cNvPr id="2" name="Title 1"/>
+          <p:cNvSpPr>
+            <a:spLocks noGrp="1"/>
+          </p:cNvSpPr>
+          <p:nvPr>
+            <p:ph type="title"/>
+          </p:nvPr>
+        </p:nvSpPr>
+        <p:spPr/>
+        <p:txBody>
+          <a:bodyPr/>
+          <a:lstStyle/>
+          <a:p>
+            <a:endParaRPr lang="en-US"/>
+          </a:p>
+        </p:txBody>
+      </p:sp>
+      <p:sp>
+        <p:nvSpPr>
+          <p:cNvPr id="3" name="Content Placeholder 2"/>
+          <p:cNvSpPr>
+            <a:spLocks noGrp="1"/>
+          </p:cNvSpPr>
+          <p:nvPr>
+            <p:ph idx="1"/>
+          </p:nvPr>
+        </p:nvSpPr>
+        <p:spPr/>
+        <p:txBody>
+          <a:bodyPr>
+            <a:normAutofit fontScale="92500" lnSpcReduction="20000"/>
+          </a:bodyPr>
+          <a:lstStyle/>
+          <a:p>
+            <a:r>
+              <a:rPr lang="en-US" dirty="0" smtClean="0"/>
+              <a:t>Release 0.9</a:t>
+            </a:r>
+          </a:p>
+          <a:p>
+            <a:r>
+              <a:rPr lang="en-US" dirty="0" smtClean="0"/>
+              <a:t>Streaming stuff</a:t>
+            </a:r>
+          </a:p>
+          <a:p>
+            <a:pPr lvl="1"/>
+            <a:r>
+              <a:rPr lang="en-US" dirty="0" smtClean="0"/>
+              <a:t>True streaming</a:t>
+            </a:r>
+          </a:p>
+          <a:p>
+            <a:pPr lvl="1"/>
+            <a:r>
+              <a:rPr lang="en-US" dirty="0" smtClean="0"/>
+              <a:t>Exactly once with low overhead</a:t>
+            </a:r>
+          </a:p>
+          <a:p>
+            <a:pPr lvl="1"/>
+            <a:r>
+              <a:rPr lang="en-US" dirty="0" smtClean="0"/>
+              <a:t>High-level programming abstractions w/ flexible windows</a:t>
+            </a:r>
+          </a:p>
+          <a:p>
+            <a:r>
+              <a:rPr lang="en-US" dirty="0" smtClean="0"/>
+              <a:t>APIs + Libraries</a:t>
+            </a:r>
+          </a:p>
+          <a:p>
+            <a:pPr lvl="1"/>
+            <a:r>
+              <a:rPr lang="en-US" dirty="0" err="1" smtClean="0"/>
+              <a:t>Gelly</a:t>
+            </a:r>
+            <a:endParaRPr lang="en-US" dirty="0" smtClean="0"/>
+          </a:p>
+          <a:p>
+            <a:pPr lvl="1"/>
+            <a:r>
+              <a:rPr lang="en-US" dirty="0" err="1" smtClean="0"/>
+              <a:t>FlinkML</a:t>
+            </a:r>
+            <a:endParaRPr lang="en-US" dirty="0" smtClean="0"/>
+          </a:p>
+          <a:p>
+            <a:pPr lvl="1"/>
+            <a:r>
+              <a:rPr lang="en-US" dirty="0" err="1" smtClean="0"/>
+              <a:t>TableAPI</a:t>
+            </a:r>
+            <a:r>
+              <a:rPr lang="en-US" dirty="0" smtClean="0"/>
+              <a:t> + SQL</a:t>
+            </a:r>
+            <a:endParaRPr lang="en-US" dirty="0"/>
+          </a:p>
+          <a:p>
+            <a:r>
+              <a:rPr lang="en-US" dirty="0" smtClean="0"/>
+              <a:t>Strongly growing community</a:t>
+            </a:r>
+            <a:endParaRPr lang="en-US" dirty="0"/>
+          </a:p>
+        </p:txBody>
+      </p:sp>
+      <p:sp>
+        <p:nvSpPr>
+          <p:cNvPr id="4" name="Slide Number Placeholder 3"/>
+          <p:cNvSpPr>
+            <a:spLocks noGrp="1"/>
+          </p:cNvSpPr>
+          <p:nvPr>
+            <p:ph type="sldNum" sz="quarter" idx="12"/>
+          </p:nvPr>
+        </p:nvSpPr>
+        <p:spPr/>
+        <p:txBody>
+          <a:bodyPr/>
+          <a:lstStyle/>
+          <a:p>
+            <a:fld id="{B07C5D84-2227-C144-B485-A8CA33CE4230}" type="slidenum">
+              <a:rPr lang="en-US" smtClean="0">
+                <a:solidFill>
+                  <a:prstClr val="black">
+                    <a:tint val="75000"/>
+                  </a:prstClr>
+                </a:solidFill>
+              </a:rPr>
+              <a:pPr/>
+              <a:t>17</a:t>
             </a:fld>
             <a:endParaRPr lang="en-US">
               <a:solidFill>
@@ -4375,6 +5248,10 @@
           <a:bodyPr/>
           <a:lstStyle/>
           <a:p>
+            <a:r>
+              <a:rPr lang="en-US" dirty="0" smtClean="0"/>
+              <a:t>There is much more!</a:t>
+            </a:r>
             <a:endParaRPr lang="en-US" dirty="0"/>
           </a:p>
         </p:txBody>
@@ -4391,30 +5268,60 @@
         </p:nvSpPr>
         <p:spPr/>
         <p:txBody>
-          <a:bodyPr/>
-          <a:lstStyle/>
-          <a:p>
-            <a:r>
-              <a:rPr lang="en-US" dirty="0" smtClean="0"/>
-              <a:t>Slides for approx. 30 </a:t>
-            </a:r>
-            <a:r>
-              <a:rPr lang="en-US" dirty="0" err="1" smtClean="0"/>
-              <a:t>Mins</a:t>
-            </a:r>
+          <a:bodyPr>
+            <a:normAutofit fontScale="92500" lnSpcReduction="10000"/>
+          </a:bodyPr>
+          <a:lstStyle/>
+          <a:p>
+            <a:r>
+              <a:rPr lang="en-US" dirty="0" smtClean="0"/>
+              <a:t>Flink Streaming</a:t>
+            </a:r>
+          </a:p>
+          <a:p>
+            <a:endParaRPr lang="en-US" dirty="0"/>
+          </a:p>
+          <a:p>
+            <a:r>
+              <a:rPr lang="en-US" dirty="0" smtClean="0"/>
+              <a:t>APIs &amp; libraries</a:t>
+            </a:r>
+          </a:p>
+          <a:p>
+            <a:pPr lvl="1"/>
+            <a:endParaRPr lang="en-US" dirty="0"/>
+          </a:p>
+          <a:p>
+            <a:r>
+              <a:rPr lang="en-US" dirty="0" smtClean="0"/>
+              <a:t>Interactive data analysis</a:t>
+            </a:r>
+          </a:p>
+          <a:p>
             <a:endParaRPr lang="en-US" dirty="0" smtClean="0"/>
           </a:p>
           <a:p>
             <a:r>
               <a:rPr lang="en-US" dirty="0" smtClean="0"/>
-              <a:t>Reuse slides if possible</a:t>
-            </a:r>
-          </a:p>
-          <a:p>
-            <a:r>
-              <a:rPr lang="en-US" dirty="0" smtClean="0"/>
-              <a:t>All examples in Java</a:t>
-            </a:r>
+              <a:t>Distributed cluster execution</a:t>
+            </a:r>
+          </a:p>
+          <a:p>
+            <a:endParaRPr lang="en-US" dirty="0"/>
+          </a:p>
+          <a:p>
+            <a:r>
+              <a:rPr lang="en-US" dirty="0" smtClean="0"/>
+              <a:t>Upcoming Flink features</a:t>
+            </a:r>
+            <a:endParaRPr lang="en-US" dirty="0"/>
+          </a:p>
+          <a:p>
+            <a:endParaRPr lang="en-US" dirty="0" smtClean="0"/>
+          </a:p>
+          <a:p>
+            <a:pPr lvl="1"/>
+            <a:endParaRPr lang="en-US" dirty="0" smtClean="0"/>
           </a:p>
         </p:txBody>
       </p:sp>
@@ -4486,7 +5393,7 @@
       </p:grpSpPr>
       <p:sp>
         <p:nvSpPr>
-          <p:cNvPr id="2" name="Title 1"/>
+          <p:cNvPr id="5" name="Title 4"/>
           <p:cNvSpPr>
             <a:spLocks noGrp="1"/>
           </p:cNvSpPr>
@@ -4499,88 +5406,30 @@
           <a:bodyPr/>
           <a:lstStyle/>
           <a:p>
+            <a:r>
+              <a:rPr lang="en-US" dirty="0" smtClean="0"/>
+              <a:t>Flink Streaming</a:t>
+            </a:r>
+            <a:endParaRPr lang="en-US" dirty="0"/>
+          </a:p>
+        </p:txBody>
+      </p:sp>
+      <p:sp>
+        <p:nvSpPr>
+          <p:cNvPr id="6" name="Text Placeholder 5"/>
+          <p:cNvSpPr>
+            <a:spLocks noGrp="1"/>
+          </p:cNvSpPr>
+          <p:nvPr>
+            <p:ph type="body" idx="1"/>
+          </p:nvPr>
+        </p:nvSpPr>
+        <p:spPr/>
+        <p:txBody>
+          <a:bodyPr/>
+          <a:lstStyle/>
+          <a:p>
             <a:endParaRPr lang="en-US"/>
-          </a:p>
-        </p:txBody>
-      </p:sp>
-      <p:sp>
-        <p:nvSpPr>
-          <p:cNvPr id="3" name="Content Placeholder 2"/>
-          <p:cNvSpPr>
-            <a:spLocks noGrp="1"/>
-          </p:cNvSpPr>
-          <p:nvPr>
-            <p:ph idx="1"/>
-          </p:nvPr>
-        </p:nvSpPr>
-        <p:spPr/>
-        <p:txBody>
-          <a:bodyPr/>
-          <a:lstStyle/>
-          <a:p>
-            <a:r>
-              <a:rPr lang="en-US" dirty="0" smtClean="0"/>
-              <a:t>Just a glimpse at what Flink can do</a:t>
-            </a:r>
-          </a:p>
-          <a:p>
-            <a:pPr lvl="1"/>
-            <a:r>
-              <a:rPr lang="en-US" dirty="0" smtClean="0"/>
-              <a:t>APIs</a:t>
-            </a:r>
-          </a:p>
-          <a:p>
-            <a:pPr lvl="1"/>
-            <a:r>
-              <a:rPr lang="en-US" dirty="0" smtClean="0"/>
-              <a:t>Tools</a:t>
-            </a:r>
-          </a:p>
-          <a:p>
-            <a:pPr lvl="2"/>
-            <a:r>
-              <a:rPr lang="en-US" dirty="0" smtClean="0"/>
-              <a:t>Zeppelin, </a:t>
-            </a:r>
-            <a:r>
-              <a:rPr lang="en-US" dirty="0" err="1" smtClean="0"/>
-              <a:t>Scala</a:t>
-            </a:r>
-            <a:r>
-              <a:rPr lang="en-US" dirty="0" smtClean="0"/>
-              <a:t> REPL</a:t>
-            </a:r>
-          </a:p>
-          <a:p>
-            <a:pPr lvl="1"/>
-            <a:r>
-              <a:rPr lang="en-US" dirty="0" smtClean="0"/>
-              <a:t>Runtime Environment</a:t>
-            </a:r>
-          </a:p>
-          <a:p>
-            <a:pPr lvl="2"/>
-            <a:r>
-              <a:rPr lang="en-US" dirty="0" smtClean="0"/>
-              <a:t>Cluster, Yarn, </a:t>
-            </a:r>
-            <a:r>
-              <a:rPr lang="en-US" dirty="0" err="1" smtClean="0"/>
-              <a:t>BDUtil</a:t>
-            </a:r>
-            <a:endParaRPr lang="en-US" dirty="0" smtClean="0"/>
-          </a:p>
-          <a:p>
-            <a:r>
-              <a:rPr lang="en-US" dirty="0" err="1" smtClean="0"/>
-              <a:t>Flink’s</a:t>
-            </a:r>
-            <a:r>
-              <a:rPr lang="en-US" dirty="0" smtClean="0"/>
-              <a:t> Future</a:t>
-            </a:r>
-            <a:endParaRPr lang="en-US" dirty="0"/>
           </a:p>
         </p:txBody>
       </p:sp>
@@ -4623,7 +5472,7 @@
     </p:spTree>
     <p:extLst>
       <p:ext uri="{BB962C8B-B14F-4D97-AF65-F5344CB8AC3E}">
-        <p14:creationId xmlns:p14="http://schemas.microsoft.com/office/powerpoint/2010/main" val="3892578444"/>
+        <p14:creationId xmlns:p14="http://schemas.microsoft.com/office/powerpoint/2010/main" val="1897123840"/>
       </p:ext>
     </p:extLst>
   </p:cSld>
@@ -4652,7 +5501,7 @@
       </p:grpSpPr>
       <p:sp>
         <p:nvSpPr>
-          <p:cNvPr id="5" name="Title 4"/>
+          <p:cNvPr id="2" name="Title 1"/>
           <p:cNvSpPr>
             <a:spLocks noGrp="1"/>
           </p:cNvSpPr>
@@ -4666,33 +5515,71 @@
           <a:lstStyle/>
           <a:p>
             <a:r>
+              <a:rPr lang="en-US" dirty="0" smtClean="0"/>
+              <a:t>DataStream API</a:t>
+            </a:r>
+            <a:endParaRPr lang="en-US" dirty="0"/>
+          </a:p>
+        </p:txBody>
+      </p:sp>
+      <p:sp>
+        <p:nvSpPr>
+          <p:cNvPr id="3" name="Content Placeholder 2"/>
+          <p:cNvSpPr>
+            <a:spLocks noGrp="1"/>
+          </p:cNvSpPr>
+          <p:nvPr>
+            <p:ph idx="1"/>
+          </p:nvPr>
+        </p:nvSpPr>
+        <p:spPr/>
+        <p:txBody>
+          <a:bodyPr/>
+          <a:lstStyle/>
+          <a:p>
+            <a:r>
+              <a:rPr lang="en-US" dirty="0" smtClean="0"/>
+              <a:t>Abstraction is called DataStream</a:t>
+            </a:r>
+          </a:p>
+          <a:p>
+            <a:pPr lvl="1"/>
+            <a:r>
+              <a:rPr lang="en-US" dirty="0" smtClean="0"/>
+              <a:t>Equivalent to </a:t>
+            </a:r>
+            <a:r>
               <a:rPr lang="en-US" dirty="0" err="1" smtClean="0"/>
-              <a:t>Flink’s</a:t>
-            </a:r>
-            <a:r>
-              <a:rPr lang="en-US" dirty="0" smtClean="0"/>
-              <a:t> APIs &amp; Libraries</a:t>
+              <a:t>DataSet</a:t>
+            </a:r>
+            <a:endParaRPr lang="en-US" dirty="0" smtClean="0"/>
+          </a:p>
+          <a:p>
+            <a:r>
+              <a:rPr lang="en-US" dirty="0" smtClean="0"/>
+              <a:t>Transformations are very similar to </a:t>
+            </a:r>
+            <a:r>
+              <a:rPr lang="en-US" dirty="0" err="1" smtClean="0"/>
+              <a:t>DataSet</a:t>
+            </a:r>
+            <a:r>
+              <a:rPr lang="en-US" dirty="0" smtClean="0"/>
+              <a:t> API</a:t>
+            </a:r>
+          </a:p>
+          <a:p>
+            <a:r>
+              <a:rPr lang="en-US" dirty="0" smtClean="0"/>
+              <a:t>Flexible window operations</a:t>
+            </a:r>
+          </a:p>
+          <a:p>
+            <a:r>
+              <a:rPr lang="en-US" dirty="0" smtClean="0"/>
+              <a:t>Evolving very quickly</a:t>
             </a:r>
             <a:endParaRPr lang="en-US" dirty="0"/>
-          </a:p>
-        </p:txBody>
-      </p:sp>
-      <p:sp>
-        <p:nvSpPr>
-          <p:cNvPr id="6" name="Text Placeholder 5"/>
-          <p:cNvSpPr>
-            <a:spLocks noGrp="1"/>
-          </p:cNvSpPr>
-          <p:nvPr>
-            <p:ph type="body" idx="1"/>
-          </p:nvPr>
-        </p:nvSpPr>
-        <p:spPr/>
-        <p:txBody>
-          <a:bodyPr/>
-          <a:lstStyle/>
-          <a:p>
-            <a:endParaRPr lang="en-US"/>
           </a:p>
         </p:txBody>
       </p:sp>
@@ -4735,7 +5622,7 @@
     </p:spTree>
     <p:extLst>
       <p:ext uri="{BB962C8B-B14F-4D97-AF65-F5344CB8AC3E}">
-        <p14:creationId xmlns:p14="http://schemas.microsoft.com/office/powerpoint/2010/main" val="1897123840"/>
+        <p14:creationId xmlns:p14="http://schemas.microsoft.com/office/powerpoint/2010/main" val="1933619288"/>
       </p:ext>
     </p:extLst>
   </p:cSld>
@@ -4764,12 +5651,12 @@
       </p:grpSpPr>
       <p:sp>
         <p:nvSpPr>
-          <p:cNvPr id="5" name="Title 4"/>
-          <p:cNvSpPr>
-            <a:spLocks noGrp="1"/>
-          </p:cNvSpPr>
-          <p:nvPr>
-            <p:ph type="title"/>
+          <p:cNvPr id="4" name="Slide Number Placeholder 3"/>
+          <p:cNvSpPr>
+            <a:spLocks noGrp="1"/>
+          </p:cNvSpPr>
+          <p:nvPr>
+            <p:ph type="sldNum" sz="quarter" idx="12"/>
           </p:nvPr>
         </p:nvSpPr>
         <p:spPr/>
@@ -4777,93 +5664,773 @@
           <a:bodyPr/>
           <a:lstStyle/>
           <a:p>
-            <a:endParaRPr lang="en-US"/>
-          </a:p>
-        </p:txBody>
-      </p:sp>
-      <p:sp>
-        <p:nvSpPr>
-          <p:cNvPr id="6" name="Content Placeholder 5"/>
-          <p:cNvSpPr>
-            <a:spLocks noGrp="1"/>
-          </p:cNvSpPr>
-          <p:nvPr>
-            <p:ph idx="1"/>
-          </p:nvPr>
-        </p:nvSpPr>
-        <p:spPr/>
-        <p:txBody>
-          <a:bodyPr/>
-          <a:lstStyle/>
-          <a:p>
-            <a:r>
-              <a:rPr lang="en-US" dirty="0" smtClean="0"/>
-              <a:t>DataStream API</a:t>
-            </a:r>
-          </a:p>
-          <a:p>
-            <a:r>
-              <a:rPr lang="en-US" dirty="0" smtClean="0"/>
-              <a:t>Batch Iterations</a:t>
-            </a:r>
-          </a:p>
-          <a:p>
-            <a:r>
-              <a:rPr lang="en-US" dirty="0" err="1" smtClean="0"/>
-              <a:t>Gelly</a:t>
-            </a:r>
-            <a:endParaRPr lang="en-US" dirty="0" smtClean="0"/>
-          </a:p>
-          <a:p>
-            <a:r>
-              <a:rPr lang="en-US" dirty="0" err="1" smtClean="0"/>
-              <a:t>FlinkML</a:t>
-            </a:r>
-            <a:endParaRPr lang="en-US" dirty="0" smtClean="0"/>
-          </a:p>
-          <a:p>
-            <a:r>
-              <a:rPr lang="en-US" dirty="0" smtClean="0"/>
-              <a:t>Python</a:t>
-            </a:r>
-            <a:endParaRPr lang="en-US" dirty="0"/>
-          </a:p>
-        </p:txBody>
-      </p:sp>
-      <p:sp>
-        <p:nvSpPr>
-          <p:cNvPr id="4" name="Slide Number Placeholder 3"/>
-          <p:cNvSpPr>
-            <a:spLocks noGrp="1"/>
-          </p:cNvSpPr>
-          <p:nvPr>
-            <p:ph type="sldNum" sz="quarter" idx="12"/>
-          </p:nvPr>
-        </p:nvSpPr>
-        <p:spPr/>
-        <p:txBody>
-          <a:bodyPr/>
-          <a:lstStyle/>
-          <a:p>
-            <a:fld id="{B07C5D84-2227-C144-B485-A8CA33CE4230}" type="slidenum">
+            <a:fld id="{B6BCA6C0-D1EA-B541-9291-94D96A48FFE6}" type="slidenum">
               <a:rPr lang="en-US" smtClean="0"/>
-              <a:pPr/>
               <a:t>5</a:t>
             </a:fld>
-            <a:endParaRPr lang="en-US"/>
+            <a:endParaRPr lang="en-US" dirty="0"/>
+          </a:p>
+        </p:txBody>
+      </p:sp>
+      <p:sp>
+        <p:nvSpPr>
+          <p:cNvPr id="5" name="Rectangle 4"/>
+          <p:cNvSpPr/>
+          <p:nvPr/>
+        </p:nvSpPr>
+        <p:spPr>
+          <a:xfrm>
+            <a:off x="433271" y="1597459"/>
+            <a:ext cx="8373844" cy="369332"/>
+          </a:xfrm>
+          <a:prstGeom prst="rect">
+            <a:avLst/>
+          </a:prstGeom>
+          <a:ln>
+            <a:solidFill>
+              <a:schemeClr val="tx1"/>
+            </a:solidFill>
+          </a:ln>
+        </p:spPr>
+        <p:txBody>
+          <a:bodyPr wrap="square">
+            <a:spAutoFit/>
+          </a:bodyPr>
+          <a:lstStyle/>
+          <a:p>
+            <a:r>
+              <a:rPr lang="en-US" b="1" dirty="0">
+                <a:latin typeface="Courier New" panose="02070309020205020404" pitchFamily="49" charset="0"/>
+                <a:cs typeface="Courier New" panose="02070309020205020404" pitchFamily="49" charset="0"/>
+              </a:rPr>
+              <a:t>case class </a:t>
+            </a:r>
+            <a:r>
+              <a:rPr lang="en-US" b="1" dirty="0" err="1" smtClean="0">
+                <a:solidFill>
+                  <a:schemeClr val="accent1"/>
+                </a:solidFill>
+                <a:latin typeface="Courier New" panose="02070309020205020404" pitchFamily="49" charset="0"/>
+                <a:cs typeface="Courier New" panose="02070309020205020404" pitchFamily="49" charset="0"/>
+              </a:rPr>
+              <a:t>WordCount</a:t>
+            </a:r>
+            <a:r>
+              <a:rPr lang="en-US" dirty="0" smtClean="0">
+                <a:solidFill>
+                  <a:schemeClr val="accent1"/>
+                </a:solidFill>
+                <a:latin typeface="Courier New" panose="02070309020205020404" pitchFamily="49" charset="0"/>
+                <a:cs typeface="Courier New" panose="02070309020205020404" pitchFamily="49" charset="0"/>
+              </a:rPr>
+              <a:t> </a:t>
+            </a:r>
+            <a:r>
+              <a:rPr lang="en-US" dirty="0">
+                <a:latin typeface="Courier New" panose="02070309020205020404" pitchFamily="49" charset="0"/>
+                <a:cs typeface="Courier New" panose="02070309020205020404" pitchFamily="49" charset="0"/>
+              </a:rPr>
+              <a:t>(</a:t>
+            </a:r>
+            <a:r>
+              <a:rPr lang="en-US" b="1" dirty="0">
+                <a:solidFill>
+                  <a:schemeClr val="accent1"/>
+                </a:solidFill>
+                <a:latin typeface="Courier New" panose="02070309020205020404" pitchFamily="49" charset="0"/>
+                <a:cs typeface="Courier New" panose="02070309020205020404" pitchFamily="49" charset="0"/>
+              </a:rPr>
+              <a:t>word</a:t>
+            </a:r>
+            <a:r>
+              <a:rPr lang="en-US" dirty="0">
+                <a:latin typeface="Courier New" panose="02070309020205020404" pitchFamily="49" charset="0"/>
+                <a:cs typeface="Courier New" panose="02070309020205020404" pitchFamily="49" charset="0"/>
+              </a:rPr>
+              <a:t>: String, </a:t>
+            </a:r>
+            <a:r>
+              <a:rPr lang="en-US" b="1" dirty="0" smtClean="0">
+                <a:solidFill>
+                  <a:schemeClr val="accent1"/>
+                </a:solidFill>
+                <a:latin typeface="Courier New" panose="02070309020205020404" pitchFamily="49" charset="0"/>
+                <a:cs typeface="Courier New" panose="02070309020205020404" pitchFamily="49" charset="0"/>
+              </a:rPr>
+              <a:t>count</a:t>
+            </a:r>
+            <a:r>
+              <a:rPr lang="en-US" dirty="0" smtClean="0">
+                <a:latin typeface="Courier New" panose="02070309020205020404" pitchFamily="49" charset="0"/>
+                <a:cs typeface="Courier New" panose="02070309020205020404" pitchFamily="49" charset="0"/>
+              </a:rPr>
+              <a:t>: </a:t>
+            </a:r>
+            <a:r>
+              <a:rPr lang="en-US" dirty="0">
+                <a:latin typeface="Courier New" panose="02070309020205020404" pitchFamily="49" charset="0"/>
+                <a:cs typeface="Courier New" panose="02070309020205020404" pitchFamily="49" charset="0"/>
+              </a:rPr>
+              <a:t>Int</a:t>
+            </a:r>
+            <a:r>
+              <a:rPr lang="en-US" dirty="0" smtClean="0">
+                <a:latin typeface="Courier New" panose="02070309020205020404" pitchFamily="49" charset="0"/>
+                <a:cs typeface="Courier New" panose="02070309020205020404" pitchFamily="49" charset="0"/>
+              </a:rPr>
+              <a:t>)</a:t>
+            </a:r>
+            <a:endParaRPr lang="en-US" dirty="0">
+              <a:latin typeface="Courier New" panose="02070309020205020404" pitchFamily="49" charset="0"/>
+              <a:cs typeface="Courier New" panose="02070309020205020404" pitchFamily="49" charset="0"/>
+            </a:endParaRPr>
+          </a:p>
+        </p:txBody>
+      </p:sp>
+      <p:sp>
+        <p:nvSpPr>
+          <p:cNvPr id="6" name="Rectangle 5"/>
+          <p:cNvSpPr/>
+          <p:nvPr/>
+        </p:nvSpPr>
+        <p:spPr>
+          <a:xfrm>
+            <a:off x="433272" y="4547533"/>
+            <a:ext cx="8373844" cy="1862048"/>
+          </a:xfrm>
+          <a:prstGeom prst="rect">
+            <a:avLst/>
+          </a:prstGeom>
+          <a:ln>
+            <a:solidFill>
+              <a:schemeClr val="tx1"/>
+            </a:solidFill>
+          </a:ln>
+        </p:spPr>
+        <p:txBody>
+          <a:bodyPr wrap="square">
+            <a:spAutoFit/>
+          </a:bodyPr>
+          <a:lstStyle/>
+          <a:p>
+            <a:r>
+              <a:rPr lang="en-US" dirty="0" smtClean="0">
+                <a:latin typeface="Courier New" panose="02070309020205020404" pitchFamily="49" charset="0"/>
+                <a:cs typeface="Courier New" panose="02070309020205020404" pitchFamily="49" charset="0"/>
+              </a:rPr>
+              <a:t>val lines: </a:t>
+            </a:r>
+            <a:r>
+              <a:rPr lang="en-US" b="1" dirty="0" smtClean="0">
+                <a:latin typeface="Courier New" panose="02070309020205020404" pitchFamily="49" charset="0"/>
+                <a:cs typeface="Courier New" panose="02070309020205020404" pitchFamily="49" charset="0"/>
+              </a:rPr>
+              <a:t>DataStream[String]</a:t>
+            </a:r>
+            <a:r>
+              <a:rPr lang="en-US" dirty="0" smtClean="0">
+                <a:latin typeface="Courier New" panose="02070309020205020404" pitchFamily="49" charset="0"/>
+                <a:cs typeface="Courier New" panose="02070309020205020404" pitchFamily="49" charset="0"/>
+              </a:rPr>
+              <a:t> = env.fromSocketStream(...)</a:t>
+            </a:r>
+          </a:p>
+          <a:p>
+            <a:endParaRPr lang="en-US" sz="700" dirty="0" smtClean="0">
+              <a:latin typeface="Courier New" panose="02070309020205020404" pitchFamily="49" charset="0"/>
+              <a:cs typeface="Courier New" panose="02070309020205020404" pitchFamily="49" charset="0"/>
+            </a:endParaRPr>
+          </a:p>
+          <a:p>
+            <a:r>
+              <a:rPr lang="en-US" dirty="0" smtClean="0">
+                <a:latin typeface="Courier New" panose="02070309020205020404" pitchFamily="49" charset="0"/>
+                <a:cs typeface="Courier New" panose="02070309020205020404" pitchFamily="49" charset="0"/>
+              </a:rPr>
+              <a:t>lines.</a:t>
+            </a:r>
+            <a:r>
+              <a:rPr lang="en-US" b="1" dirty="0">
+                <a:solidFill>
+                  <a:schemeClr val="accent2"/>
+                </a:solidFill>
+                <a:latin typeface="Courier New" panose="02070309020205020404" pitchFamily="49" charset="0"/>
+                <a:cs typeface="Courier New" panose="02070309020205020404" pitchFamily="49" charset="0"/>
+              </a:rPr>
+              <a:t>flatMap</a:t>
+            </a:r>
+            <a:r>
+              <a:rPr lang="en-US" dirty="0" smtClean="0">
+                <a:latin typeface="Courier New" panose="02070309020205020404" pitchFamily="49" charset="0"/>
+                <a:cs typeface="Courier New" panose="02070309020205020404" pitchFamily="49" charset="0"/>
+              </a:rPr>
+              <a:t> {line =&gt; line.split(" ")</a:t>
+            </a:r>
+          </a:p>
+          <a:p>
+            <a:r>
+              <a:rPr lang="en-US" dirty="0" smtClean="0">
+                <a:latin typeface="Courier New" panose="02070309020205020404" pitchFamily="49" charset="0"/>
+                <a:cs typeface="Courier New" panose="02070309020205020404" pitchFamily="49" charset="0"/>
+              </a:rPr>
+              <a:t>                           .map(word =&gt; </a:t>
+            </a:r>
+            <a:r>
+              <a:rPr lang="en-US" b="1" dirty="0" err="1" smtClean="0">
+                <a:solidFill>
+                  <a:schemeClr val="accent1"/>
+                </a:solidFill>
+                <a:latin typeface="Courier New" panose="02070309020205020404" pitchFamily="49" charset="0"/>
+                <a:cs typeface="Courier New" panose="02070309020205020404" pitchFamily="49" charset="0"/>
+              </a:rPr>
+              <a:t>WordCount</a:t>
+            </a:r>
+            <a:r>
+              <a:rPr lang="en-US" dirty="0" smtClean="0">
+                <a:latin typeface="Courier New" panose="02070309020205020404" pitchFamily="49" charset="0"/>
+                <a:cs typeface="Courier New" panose="02070309020205020404" pitchFamily="49" charset="0"/>
+              </a:rPr>
+              <a:t>(word,1))}  </a:t>
+            </a:r>
+          </a:p>
+          <a:p>
+            <a:r>
+              <a:rPr lang="en-US" dirty="0" smtClean="0">
+                <a:latin typeface="Courier New" panose="02070309020205020404" pitchFamily="49" charset="0"/>
+                <a:cs typeface="Courier New" panose="02070309020205020404" pitchFamily="49" charset="0"/>
+              </a:rPr>
+              <a:t>     .</a:t>
+            </a:r>
+            <a:r>
+              <a:rPr lang="en-US" b="1" dirty="0" smtClean="0">
+                <a:solidFill>
+                  <a:schemeClr val="accent2"/>
+                </a:solidFill>
+                <a:latin typeface="Courier New" panose="02070309020205020404" pitchFamily="49" charset="0"/>
+                <a:cs typeface="Courier New" panose="02070309020205020404" pitchFamily="49" charset="0"/>
+              </a:rPr>
+              <a:t>window</a:t>
+            </a:r>
+            <a:r>
+              <a:rPr lang="en-US" dirty="0" smtClean="0">
+                <a:latin typeface="Courier New" panose="02070309020205020404" pitchFamily="49" charset="0"/>
+                <a:cs typeface="Courier New" panose="02070309020205020404" pitchFamily="49" charset="0"/>
+              </a:rPr>
+              <a:t>(Count.of(1000)).</a:t>
+            </a:r>
+            <a:r>
+              <a:rPr lang="en-US" b="1" dirty="0" smtClean="0">
+                <a:solidFill>
+                  <a:schemeClr val="accent2"/>
+                </a:solidFill>
+                <a:latin typeface="Courier New" panose="02070309020205020404" pitchFamily="49" charset="0"/>
+                <a:cs typeface="Courier New" panose="02070309020205020404" pitchFamily="49" charset="0"/>
+              </a:rPr>
+              <a:t>every</a:t>
+            </a:r>
+            <a:r>
+              <a:rPr lang="en-US" dirty="0" smtClean="0">
+                <a:latin typeface="Courier New" panose="02070309020205020404" pitchFamily="49" charset="0"/>
+                <a:cs typeface="Courier New" panose="02070309020205020404" pitchFamily="49" charset="0"/>
+              </a:rPr>
+              <a:t>(Count.of(100))</a:t>
+            </a:r>
+          </a:p>
+          <a:p>
+            <a:r>
+              <a:rPr lang="en-US" dirty="0" smtClean="0">
+                <a:latin typeface="Courier New" panose="02070309020205020404" pitchFamily="49" charset="0"/>
+                <a:cs typeface="Courier New" panose="02070309020205020404" pitchFamily="49" charset="0"/>
+              </a:rPr>
+              <a:t>     .</a:t>
+            </a:r>
+            <a:r>
+              <a:rPr lang="en-US" b="1" dirty="0">
+                <a:solidFill>
+                  <a:schemeClr val="accent2"/>
+                </a:solidFill>
+                <a:latin typeface="Courier New" panose="02070309020205020404" pitchFamily="49" charset="0"/>
+                <a:cs typeface="Courier New" panose="02070309020205020404" pitchFamily="49" charset="0"/>
+              </a:rPr>
+              <a:t>groupBy</a:t>
+            </a:r>
+            <a:r>
+              <a:rPr lang="en-US" dirty="0" smtClean="0">
+                <a:latin typeface="Courier New" panose="02070309020205020404" pitchFamily="49" charset="0"/>
+                <a:cs typeface="Courier New" panose="02070309020205020404" pitchFamily="49" charset="0"/>
+              </a:rPr>
+              <a:t>(</a:t>
+            </a:r>
+            <a:r>
+              <a:rPr lang="en-US" b="1" dirty="0" smtClean="0">
+                <a:solidFill>
+                  <a:schemeClr val="accent1"/>
+                </a:solidFill>
+                <a:latin typeface="Courier New" panose="02070309020205020404" pitchFamily="49" charset="0"/>
+                <a:cs typeface="Courier New" panose="02070309020205020404" pitchFamily="49" charset="0"/>
+              </a:rPr>
+              <a:t>"word"</a:t>
+            </a:r>
+            <a:r>
+              <a:rPr lang="en-US" dirty="0" smtClean="0">
+                <a:latin typeface="Courier New" panose="02070309020205020404" pitchFamily="49" charset="0"/>
+                <a:cs typeface="Courier New" panose="02070309020205020404" pitchFamily="49" charset="0"/>
+              </a:rPr>
+              <a:t>).</a:t>
+            </a:r>
+            <a:r>
+              <a:rPr lang="en-US" b="1" dirty="0">
+                <a:solidFill>
+                  <a:schemeClr val="accent2"/>
+                </a:solidFill>
+                <a:latin typeface="Courier New" panose="02070309020205020404" pitchFamily="49" charset="0"/>
+                <a:cs typeface="Courier New" panose="02070309020205020404" pitchFamily="49" charset="0"/>
+              </a:rPr>
+              <a:t>sum</a:t>
+            </a:r>
+            <a:r>
+              <a:rPr lang="en-US" dirty="0" smtClean="0">
+                <a:latin typeface="Courier New" panose="02070309020205020404" pitchFamily="49" charset="0"/>
+                <a:cs typeface="Courier New" panose="02070309020205020404" pitchFamily="49" charset="0"/>
+              </a:rPr>
+              <a:t>(</a:t>
+            </a:r>
+            <a:r>
+              <a:rPr lang="en-US" b="1" dirty="0">
+                <a:solidFill>
+                  <a:schemeClr val="accent1"/>
+                </a:solidFill>
+                <a:latin typeface="Courier New" panose="02070309020205020404" pitchFamily="49" charset="0"/>
+                <a:cs typeface="Courier New" panose="02070309020205020404" pitchFamily="49" charset="0"/>
+              </a:rPr>
+              <a:t>"count</a:t>
+            </a:r>
+            <a:r>
+              <a:rPr lang="en-US" b="1" dirty="0" smtClean="0">
+                <a:solidFill>
+                  <a:schemeClr val="accent1"/>
+                </a:solidFill>
+                <a:latin typeface="Courier New" panose="02070309020205020404" pitchFamily="49" charset="0"/>
+                <a:cs typeface="Courier New" panose="02070309020205020404" pitchFamily="49" charset="0"/>
+              </a:rPr>
+              <a:t>"</a:t>
+            </a:r>
+            <a:r>
+              <a:rPr lang="en-US" dirty="0">
+                <a:latin typeface="Courier New" panose="02070309020205020404" pitchFamily="49" charset="0"/>
+                <a:cs typeface="Courier New" panose="02070309020205020404" pitchFamily="49" charset="0"/>
+              </a:rPr>
+              <a:t>)</a:t>
+            </a:r>
+          </a:p>
+          <a:p>
+            <a:r>
+              <a:rPr lang="en-US" dirty="0" smtClean="0">
+                <a:latin typeface="Courier New" panose="02070309020205020404" pitchFamily="49" charset="0"/>
+                <a:cs typeface="Courier New" panose="02070309020205020404" pitchFamily="49" charset="0"/>
+              </a:rPr>
+              <a:t>     .print()</a:t>
+            </a:r>
+          </a:p>
+        </p:txBody>
+      </p:sp>
+      <p:sp>
+        <p:nvSpPr>
+          <p:cNvPr id="7" name="Rectangle 6"/>
+          <p:cNvSpPr/>
+          <p:nvPr/>
+        </p:nvSpPr>
+        <p:spPr>
+          <a:xfrm>
+            <a:off x="433271" y="2488700"/>
+            <a:ext cx="8373844" cy="1585049"/>
+          </a:xfrm>
+          <a:prstGeom prst="rect">
+            <a:avLst/>
+          </a:prstGeom>
+          <a:noFill/>
+          <a:ln>
+            <a:solidFill>
+              <a:schemeClr val="tx1"/>
+            </a:solidFill>
+          </a:ln>
+        </p:spPr>
+        <p:txBody>
+          <a:bodyPr wrap="square">
+            <a:spAutoFit/>
+          </a:bodyPr>
+          <a:lstStyle/>
+          <a:p>
+            <a:r>
+              <a:rPr lang="en-US" dirty="0" smtClean="0">
+                <a:latin typeface="Courier New" panose="02070309020205020404" pitchFamily="49" charset="0"/>
+                <a:cs typeface="Courier New" panose="02070309020205020404" pitchFamily="49" charset="0"/>
+              </a:rPr>
+              <a:t>val lines: </a:t>
+            </a:r>
+            <a:r>
+              <a:rPr lang="en-US" b="1" dirty="0" smtClean="0">
+                <a:latin typeface="Courier New" panose="02070309020205020404" pitchFamily="49" charset="0"/>
+                <a:cs typeface="Courier New" panose="02070309020205020404" pitchFamily="49" charset="0"/>
+              </a:rPr>
+              <a:t>DataSet[String]</a:t>
+            </a:r>
+            <a:r>
+              <a:rPr lang="en-US" dirty="0" smtClean="0">
+                <a:latin typeface="Courier New" panose="02070309020205020404" pitchFamily="49" charset="0"/>
+                <a:cs typeface="Courier New" panose="02070309020205020404" pitchFamily="49" charset="0"/>
+              </a:rPr>
+              <a:t> </a:t>
+            </a:r>
+            <a:r>
+              <a:rPr lang="en-US" dirty="0">
+                <a:latin typeface="Courier New" panose="02070309020205020404" pitchFamily="49" charset="0"/>
+                <a:cs typeface="Courier New" panose="02070309020205020404" pitchFamily="49" charset="0"/>
+              </a:rPr>
+              <a:t>= env.readTextFile(...)</a:t>
+            </a:r>
+          </a:p>
+          <a:p>
+            <a:endParaRPr lang="en-US" sz="700" dirty="0" smtClean="0">
+              <a:latin typeface="Courier New" panose="02070309020205020404" pitchFamily="49" charset="0"/>
+              <a:cs typeface="Courier New" panose="02070309020205020404" pitchFamily="49" charset="0"/>
+            </a:endParaRPr>
+          </a:p>
+          <a:p>
+            <a:r>
+              <a:rPr lang="en-US" dirty="0" smtClean="0">
+                <a:latin typeface="Courier New" panose="02070309020205020404" pitchFamily="49" charset="0"/>
+                <a:cs typeface="Courier New" panose="02070309020205020404" pitchFamily="49" charset="0"/>
+              </a:rPr>
+              <a:t>lines.</a:t>
+            </a:r>
+            <a:r>
+              <a:rPr lang="en-US" b="1" dirty="0" smtClean="0">
+                <a:solidFill>
+                  <a:schemeClr val="accent2"/>
+                </a:solidFill>
+                <a:latin typeface="Courier New" panose="02070309020205020404" pitchFamily="49" charset="0"/>
+                <a:cs typeface="Courier New" panose="02070309020205020404" pitchFamily="49" charset="0"/>
+              </a:rPr>
+              <a:t>flatMap</a:t>
+            </a:r>
+            <a:r>
+              <a:rPr lang="en-US" dirty="0" smtClean="0">
+                <a:latin typeface="Courier New" panose="02070309020205020404" pitchFamily="49" charset="0"/>
+                <a:cs typeface="Courier New" panose="02070309020205020404" pitchFamily="49" charset="0"/>
+              </a:rPr>
+              <a:t> </a:t>
+            </a:r>
+            <a:r>
+              <a:rPr lang="en-US" dirty="0">
+                <a:latin typeface="Courier New" panose="02070309020205020404" pitchFamily="49" charset="0"/>
+                <a:cs typeface="Courier New" panose="02070309020205020404" pitchFamily="49" charset="0"/>
+              </a:rPr>
+              <a:t>{line =&gt; line.split(" </a:t>
+            </a:r>
+            <a:r>
+              <a:rPr lang="en-US" dirty="0" smtClean="0">
+                <a:latin typeface="Courier New" panose="02070309020205020404" pitchFamily="49" charset="0"/>
+                <a:cs typeface="Courier New" panose="02070309020205020404" pitchFamily="49" charset="0"/>
+              </a:rPr>
+              <a:t>")</a:t>
+            </a:r>
+          </a:p>
+          <a:p>
+            <a:r>
+              <a:rPr lang="en-US" dirty="0">
+                <a:latin typeface="Courier New" panose="02070309020205020404" pitchFamily="49" charset="0"/>
+                <a:cs typeface="Courier New" panose="02070309020205020404" pitchFamily="49" charset="0"/>
+              </a:rPr>
+              <a:t> </a:t>
+            </a:r>
+            <a:r>
+              <a:rPr lang="en-US" dirty="0" smtClean="0">
+                <a:latin typeface="Courier New" panose="02070309020205020404" pitchFamily="49" charset="0"/>
+                <a:cs typeface="Courier New" panose="02070309020205020404" pitchFamily="49" charset="0"/>
+              </a:rPr>
+              <a:t>                          .map(word =&gt; </a:t>
+            </a:r>
+            <a:r>
+              <a:rPr lang="en-US" b="1" dirty="0" err="1" smtClean="0">
+                <a:solidFill>
+                  <a:schemeClr val="accent1"/>
+                </a:solidFill>
+                <a:latin typeface="Courier New" panose="02070309020205020404" pitchFamily="49" charset="0"/>
+                <a:cs typeface="Courier New" panose="02070309020205020404" pitchFamily="49" charset="0"/>
+              </a:rPr>
+              <a:t>WordCount</a:t>
+            </a:r>
+            <a:r>
+              <a:rPr lang="en-US" dirty="0" smtClean="0">
+                <a:latin typeface="Courier New" panose="02070309020205020404" pitchFamily="49" charset="0"/>
+                <a:cs typeface="Courier New" panose="02070309020205020404" pitchFamily="49" charset="0"/>
+              </a:rPr>
+              <a:t>(word,1))}  </a:t>
+            </a:r>
+          </a:p>
+          <a:p>
+            <a:r>
+              <a:rPr lang="en-US" dirty="0" smtClean="0">
+                <a:latin typeface="Courier New" panose="02070309020205020404" pitchFamily="49" charset="0"/>
+                <a:cs typeface="Courier New" panose="02070309020205020404" pitchFamily="49" charset="0"/>
+              </a:rPr>
+              <a:t>     .</a:t>
+            </a:r>
+            <a:r>
+              <a:rPr lang="en-US" b="1" dirty="0">
+                <a:solidFill>
+                  <a:schemeClr val="accent2"/>
+                </a:solidFill>
+                <a:latin typeface="Courier New" panose="02070309020205020404" pitchFamily="49" charset="0"/>
+                <a:cs typeface="Courier New" panose="02070309020205020404" pitchFamily="49" charset="0"/>
+              </a:rPr>
+              <a:t>groupBy</a:t>
+            </a:r>
+            <a:r>
+              <a:rPr lang="en-US" dirty="0">
+                <a:latin typeface="Courier New" panose="02070309020205020404" pitchFamily="49" charset="0"/>
+                <a:cs typeface="Courier New" panose="02070309020205020404" pitchFamily="49" charset="0"/>
+              </a:rPr>
+              <a:t>(</a:t>
+            </a:r>
+            <a:r>
+              <a:rPr lang="en-US" b="1" dirty="0">
+                <a:solidFill>
+                  <a:schemeClr val="accent1"/>
+                </a:solidFill>
+                <a:latin typeface="Courier New" panose="02070309020205020404" pitchFamily="49" charset="0"/>
+                <a:cs typeface="Courier New" panose="02070309020205020404" pitchFamily="49" charset="0"/>
+              </a:rPr>
+              <a:t>"word"</a:t>
+            </a:r>
+            <a:r>
+              <a:rPr lang="en-US" dirty="0">
+                <a:latin typeface="Courier New" panose="02070309020205020404" pitchFamily="49" charset="0"/>
+                <a:cs typeface="Courier New" panose="02070309020205020404" pitchFamily="49" charset="0"/>
+              </a:rPr>
+              <a:t>).</a:t>
+            </a:r>
+            <a:r>
+              <a:rPr lang="en-US" b="1" dirty="0">
+                <a:solidFill>
+                  <a:schemeClr val="accent2"/>
+                </a:solidFill>
+                <a:latin typeface="Courier New" panose="02070309020205020404" pitchFamily="49" charset="0"/>
+                <a:cs typeface="Courier New" panose="02070309020205020404" pitchFamily="49" charset="0"/>
+              </a:rPr>
+              <a:t>sum</a:t>
+            </a:r>
+            <a:r>
+              <a:rPr lang="en-US" dirty="0" smtClean="0">
+                <a:latin typeface="Courier New" panose="02070309020205020404" pitchFamily="49" charset="0"/>
+                <a:cs typeface="Courier New" panose="02070309020205020404" pitchFamily="49" charset="0"/>
+              </a:rPr>
+              <a:t>(</a:t>
+            </a:r>
+            <a:r>
+              <a:rPr lang="en-US" b="1" dirty="0">
+                <a:solidFill>
+                  <a:schemeClr val="accent1"/>
+                </a:solidFill>
+                <a:latin typeface="Courier New" panose="02070309020205020404" pitchFamily="49" charset="0"/>
+                <a:cs typeface="Courier New" panose="02070309020205020404" pitchFamily="49" charset="0"/>
+              </a:rPr>
+              <a:t>"count</a:t>
+            </a:r>
+            <a:r>
+              <a:rPr lang="en-US" b="1" dirty="0" smtClean="0">
+                <a:solidFill>
+                  <a:schemeClr val="accent1"/>
+                </a:solidFill>
+                <a:latin typeface="Courier New" panose="02070309020205020404" pitchFamily="49" charset="0"/>
+                <a:cs typeface="Courier New" panose="02070309020205020404" pitchFamily="49" charset="0"/>
+              </a:rPr>
+              <a:t>"</a:t>
+            </a:r>
+            <a:r>
+              <a:rPr lang="en-US" dirty="0" smtClean="0">
+                <a:latin typeface="Courier New" panose="02070309020205020404" pitchFamily="49" charset="0"/>
+                <a:cs typeface="Courier New" panose="02070309020205020404" pitchFamily="49" charset="0"/>
+              </a:rPr>
+              <a:t>)</a:t>
+            </a:r>
+            <a:endParaRPr lang="en-US" dirty="0">
+              <a:latin typeface="Courier New" panose="02070309020205020404" pitchFamily="49" charset="0"/>
+              <a:cs typeface="Courier New" panose="02070309020205020404" pitchFamily="49" charset="0"/>
+            </a:endParaRPr>
+          </a:p>
+          <a:p>
+            <a:r>
+              <a:rPr lang="en-US" dirty="0">
+                <a:latin typeface="Courier New" panose="02070309020205020404" pitchFamily="49" charset="0"/>
+                <a:cs typeface="Courier New" panose="02070309020205020404" pitchFamily="49" charset="0"/>
+              </a:rPr>
+              <a:t>   </a:t>
+            </a:r>
+            <a:r>
+              <a:rPr lang="en-US" dirty="0" smtClean="0">
+                <a:latin typeface="Courier New" panose="02070309020205020404" pitchFamily="49" charset="0"/>
+                <a:cs typeface="Courier New" panose="02070309020205020404" pitchFamily="49" charset="0"/>
+              </a:rPr>
+              <a:t>  .</a:t>
+            </a:r>
+            <a:r>
+              <a:rPr lang="en-US" dirty="0">
+                <a:latin typeface="Courier New" panose="02070309020205020404" pitchFamily="49" charset="0"/>
+                <a:cs typeface="Courier New" panose="02070309020205020404" pitchFamily="49" charset="0"/>
+              </a:rPr>
+              <a:t>print</a:t>
+            </a:r>
+            <a:r>
+              <a:rPr lang="en-US" dirty="0" smtClean="0">
+                <a:latin typeface="Courier New" panose="02070309020205020404" pitchFamily="49" charset="0"/>
+                <a:cs typeface="Courier New" panose="02070309020205020404" pitchFamily="49" charset="0"/>
+              </a:rPr>
+              <a:t>()</a:t>
+            </a:r>
+            <a:endParaRPr lang="en-US" sz="1900" dirty="0">
+              <a:latin typeface="Courier New" panose="02070309020205020404" pitchFamily="49" charset="0"/>
+              <a:cs typeface="Courier New" panose="02070309020205020404" pitchFamily="49" charset="0"/>
+            </a:endParaRPr>
+          </a:p>
+        </p:txBody>
+      </p:sp>
+      <p:sp>
+        <p:nvSpPr>
+          <p:cNvPr id="8" name="TextBox 7"/>
+          <p:cNvSpPr txBox="1"/>
+          <p:nvPr/>
+        </p:nvSpPr>
+        <p:spPr>
+          <a:xfrm>
+            <a:off x="337019" y="2100118"/>
+            <a:ext cx="2518895" cy="400110"/>
+          </a:xfrm>
+          <a:prstGeom prst="rect">
+            <a:avLst/>
+          </a:prstGeom>
+          <a:noFill/>
+        </p:spPr>
+        <p:txBody>
+          <a:bodyPr wrap="none" rtlCol="0">
+            <a:spAutoFit/>
+          </a:bodyPr>
+          <a:lstStyle/>
+          <a:p>
+            <a:r>
+              <a:rPr lang="de-DE" sz="2000" dirty="0" smtClean="0"/>
+              <a:t>DataSet API (batch):</a:t>
+            </a:r>
+            <a:endParaRPr lang="en-US" sz="2000" dirty="0"/>
+          </a:p>
+        </p:txBody>
+      </p:sp>
+      <p:sp>
+        <p:nvSpPr>
+          <p:cNvPr id="9" name="TextBox 8"/>
+          <p:cNvSpPr txBox="1"/>
+          <p:nvPr/>
+        </p:nvSpPr>
+        <p:spPr>
+          <a:xfrm>
+            <a:off x="337019" y="4168576"/>
+            <a:ext cx="3458254" cy="400110"/>
+          </a:xfrm>
+          <a:prstGeom prst="rect">
+            <a:avLst/>
+          </a:prstGeom>
+          <a:noFill/>
+        </p:spPr>
+        <p:txBody>
+          <a:bodyPr wrap="none" rtlCol="0">
+            <a:spAutoFit/>
+          </a:bodyPr>
+          <a:lstStyle/>
+          <a:p>
+            <a:r>
+              <a:rPr lang="de-DE" sz="2000" dirty="0" smtClean="0"/>
+              <a:t>DataStream API (streaming):</a:t>
+            </a:r>
+            <a:endParaRPr lang="en-US" sz="2000" dirty="0"/>
+          </a:p>
+        </p:txBody>
+      </p:sp>
+      <p:sp>
+        <p:nvSpPr>
+          <p:cNvPr id="10" name="Title 4"/>
+          <p:cNvSpPr txBox="1">
+            <a:spLocks/>
+          </p:cNvSpPr>
+          <p:nvPr/>
+        </p:nvSpPr>
+        <p:spPr>
+          <a:xfrm>
+            <a:off x="457200" y="274638"/>
+            <a:ext cx="7474685" cy="898406"/>
+          </a:xfrm>
+          <a:prstGeom prst="rect">
+            <a:avLst/>
+          </a:prstGeom>
+        </p:spPr>
+        <p:txBody>
+          <a:bodyPr vert="horz" lIns="91440" tIns="45720" rIns="91440" bIns="45720" rtlCol="0" anchor="ctr">
+            <a:normAutofit fontScale="70000" lnSpcReduction="20000"/>
+          </a:bodyPr>
+          <a:lstStyle>
+            <a:lvl1pPr algn="l" defTabSz="457200" rtl="0" eaLnBrk="1" latinLnBrk="0" hangingPunct="1">
+              <a:spcBef>
+                <a:spcPct val="0"/>
+              </a:spcBef>
+              <a:buNone/>
+              <a:defRPr sz="4400" kern="1200">
+                <a:solidFill>
+                  <a:schemeClr val="tx1"/>
+                </a:solidFill>
+                <a:latin typeface="Avenir Next Demi Bold"/>
+                <a:ea typeface="+mj-ea"/>
+                <a:cs typeface="Avenir Next Demi Bold"/>
+              </a:defRPr>
+            </a:lvl1pPr>
+          </a:lstStyle>
+          <a:p>
+            <a:r>
+              <a:rPr lang="de-DE" dirty="0" err="1"/>
+              <a:t>Counting</a:t>
+            </a:r>
+            <a:r>
+              <a:rPr lang="de-DE" dirty="0"/>
+              <a:t> Words in Batch </a:t>
+            </a:r>
+            <a:r>
+              <a:rPr lang="de-DE" dirty="0" err="1"/>
+              <a:t>and</a:t>
+            </a:r>
+            <a:r>
+              <a:rPr lang="de-DE" dirty="0"/>
+              <a:t> Stream</a:t>
+            </a:r>
+            <a:endParaRPr lang="en-US" dirty="0"/>
           </a:p>
         </p:txBody>
       </p:sp>
     </p:spTree>
     <p:extLst>
       <p:ext uri="{BB962C8B-B14F-4D97-AF65-F5344CB8AC3E}">
-        <p14:creationId xmlns:p14="http://schemas.microsoft.com/office/powerpoint/2010/main" val="1943660489"/>
+        <p14:creationId xmlns:p14="http://schemas.microsoft.com/office/powerpoint/2010/main" val="3413311327"/>
       </p:ext>
     </p:extLst>
   </p:cSld>
   <p:clrMapOvr>
     <a:masterClrMapping/>
   </p:clrMapOvr>
+  <p:timing>
+    <p:tnLst>
+      <p:par>
+        <p:cTn xmlns:p14="http://schemas.microsoft.com/office/powerpoint/2010/main" id="1" dur="indefinite" restart="never" nodeType="tmRoot"/>
+      </p:par>
+    </p:tnLst>
+  </p:timing>
 </p:sld>
 </file>
 
@@ -4900,8 +6467,12 @@
           <a:lstStyle/>
           <a:p>
             <a:r>
-              <a:rPr lang="en-US" dirty="0" smtClean="0"/>
-              <a:t>Interactive Data Analysis</a:t>
+              <a:rPr lang="en-US" dirty="0" err="1" smtClean="0"/>
+              <a:t>Flink’s</a:t>
+            </a:r>
+            <a:r>
+              <a:rPr lang="en-US" dirty="0" smtClean="0"/>
+              <a:t> APIs &amp; Libraries</a:t>
             </a:r>
             <a:endParaRPr lang="en-US" dirty="0"/>
           </a:p>
@@ -4965,7 +6536,7 @@
     </p:spTree>
     <p:extLst>
       <p:ext uri="{BB962C8B-B14F-4D97-AF65-F5344CB8AC3E}">
-        <p14:creationId xmlns:p14="http://schemas.microsoft.com/office/powerpoint/2010/main" val="367488533"/>
+        <p14:creationId xmlns:p14="http://schemas.microsoft.com/office/powerpoint/2010/main" val="4175310046"/>
       </p:ext>
     </p:extLst>
   </p:cSld>
@@ -5007,7 +6578,11 @@
           <a:bodyPr/>
           <a:lstStyle/>
           <a:p>
-            <a:endParaRPr lang="en-US"/>
+            <a:r>
+              <a:rPr lang="en-US" dirty="0" smtClean="0"/>
+              <a:t>APIs &amp; Libraries</a:t>
+            </a:r>
+            <a:endParaRPr lang="en-US" dirty="0"/>
           </a:p>
         </p:txBody>
       </p:sp>
@@ -5023,28 +6598,64 @@
         </p:nvSpPr>
         <p:spPr/>
         <p:txBody>
-          <a:bodyPr/>
-          <a:lstStyle/>
-          <a:p>
-            <a:r>
-              <a:rPr lang="en-US" dirty="0" smtClean="0"/>
-              <a:t>Apache Zeppelin</a:t>
-            </a:r>
-          </a:p>
-          <a:p>
+          <a:bodyPr>
+            <a:normAutofit/>
+          </a:bodyPr>
+          <a:lstStyle/>
+          <a:p>
+            <a:r>
+              <a:rPr lang="en-US" dirty="0" smtClean="0"/>
+              <a:t>Flink offers more API than </a:t>
+            </a:r>
             <a:r>
               <a:rPr lang="en-US" dirty="0" err="1" smtClean="0"/>
-              <a:t>Scala</a:t>
-            </a:r>
-            <a:r>
-              <a:rPr lang="en-US" dirty="0" smtClean="0"/>
-              <a:t> REPL</a:t>
-            </a:r>
-          </a:p>
-          <a:p>
-            <a:r>
-              <a:rPr lang="en-US" dirty="0" smtClean="0"/>
-              <a:t>Result caching (WIP)</a:t>
+              <a:t>DataSet</a:t>
+            </a:r>
+            <a:endParaRPr lang="en-US" dirty="0" smtClean="0"/>
+          </a:p>
+          <a:p>
+            <a:pPr lvl="1"/>
+            <a:r>
+              <a:rPr lang="en-US" dirty="0" err="1" smtClean="0"/>
+              <a:t>DataSet</a:t>
+            </a:r>
+            <a:r>
+              <a:rPr lang="en-US" dirty="0" smtClean="0"/>
+              <a:t> Iterations</a:t>
+            </a:r>
+            <a:endParaRPr lang="en-US" dirty="0"/>
+          </a:p>
+          <a:p>
+            <a:pPr lvl="1"/>
+            <a:r>
+              <a:rPr lang="en-US" dirty="0" err="1" smtClean="0"/>
+              <a:t>Gelly</a:t>
+            </a:r>
+            <a:endParaRPr lang="en-US" dirty="0" smtClean="0"/>
+          </a:p>
+          <a:p>
+            <a:pPr lvl="1"/>
+            <a:r>
+              <a:rPr lang="en-US" dirty="0" err="1" smtClean="0"/>
+              <a:t>FlinkML</a:t>
+            </a:r>
+            <a:endParaRPr lang="en-US" dirty="0" smtClean="0"/>
+          </a:p>
+          <a:p>
+            <a:pPr lvl="1"/>
+            <a:r>
+              <a:rPr lang="en-US" dirty="0" smtClean="0"/>
+              <a:t>Python API</a:t>
+            </a:r>
+          </a:p>
+          <a:p>
+            <a:pPr lvl="1"/>
+            <a:endParaRPr lang="en-US" dirty="0"/>
+          </a:p>
+          <a:p>
+            <a:r>
+              <a:rPr lang="en-US" dirty="0" smtClean="0"/>
+              <a:t>Some are quite new but evolving quickly</a:t>
             </a:r>
             <a:endParaRPr lang="en-US" dirty="0"/>
           </a:p>
@@ -5077,7 +6688,7 @@
     </p:spTree>
     <p:extLst>
       <p:ext uri="{BB962C8B-B14F-4D97-AF65-F5344CB8AC3E}">
-        <p14:creationId xmlns:p14="http://schemas.microsoft.com/office/powerpoint/2010/main" val="795095480"/>
+        <p14:creationId xmlns:p14="http://schemas.microsoft.com/office/powerpoint/2010/main" val="1943660489"/>
       </p:ext>
     </p:extLst>
   </p:cSld>
@@ -5120,8 +6731,12 @@
           <a:lstStyle/>
           <a:p>
             <a:r>
-              <a:rPr lang="en-US" dirty="0" smtClean="0"/>
-              <a:t>Distributed Setups</a:t>
+              <a:rPr lang="en-US" dirty="0" err="1" smtClean="0"/>
+              <a:t>DataSet</a:t>
+            </a:r>
+            <a:r>
+              <a:rPr lang="en-US" dirty="0" smtClean="0"/>
+              <a:t> Iterations</a:t>
             </a:r>
             <a:endParaRPr lang="en-US" dirty="0"/>
           </a:p>
@@ -5129,20 +6744,75 @@
       </p:sp>
       <p:sp>
         <p:nvSpPr>
-          <p:cNvPr id="6" name="Text Placeholder 5"/>
-          <p:cNvSpPr>
-            <a:spLocks noGrp="1"/>
-          </p:cNvSpPr>
-          <p:nvPr>
-            <p:ph type="body" idx="1"/>
+          <p:cNvPr id="6" name="Content Placeholder 5"/>
+          <p:cNvSpPr>
+            <a:spLocks noGrp="1"/>
+          </p:cNvSpPr>
+          <p:nvPr>
+            <p:ph idx="1"/>
           </p:nvPr>
         </p:nvSpPr>
         <p:spPr/>
         <p:txBody>
-          <a:bodyPr/>
-          <a:lstStyle/>
-          <a:p>
-            <a:endParaRPr lang="en-US"/>
+          <a:bodyPr>
+            <a:normAutofit fontScale="92500" lnSpcReduction="10000"/>
+          </a:bodyPr>
+          <a:lstStyle/>
+          <a:p>
+            <a:r>
+              <a:rPr lang="en-US" dirty="0" smtClean="0"/>
+              <a:t>Two dedicated iteration operators</a:t>
+            </a:r>
+          </a:p>
+          <a:p>
+            <a:pPr lvl="1"/>
+            <a:r>
+              <a:rPr lang="en-US" dirty="0" smtClean="0"/>
+              <a:t>Bulk iterations are similar to for-loops</a:t>
+            </a:r>
+          </a:p>
+          <a:p>
+            <a:pPr lvl="1"/>
+            <a:r>
+              <a:rPr lang="en-US" dirty="0" smtClean="0"/>
+              <a:t>Delta iterations are very efficient for certain types of problems (graphs!)</a:t>
+            </a:r>
+          </a:p>
+          <a:p>
+            <a:pPr lvl="1"/>
+            <a:endParaRPr lang="en-US" dirty="0"/>
+          </a:p>
+          <a:p>
+            <a:r>
+              <a:rPr lang="en-US" dirty="0" smtClean="0"/>
+              <a:t>Flink executes iterations natively</a:t>
+            </a:r>
+          </a:p>
+          <a:p>
+            <a:pPr lvl="1"/>
+            <a:r>
+              <a:rPr lang="en-US" dirty="0" smtClean="0"/>
+              <a:t>Operators are scheduled once and maintain state</a:t>
+            </a:r>
+          </a:p>
+          <a:p>
+            <a:pPr lvl="1"/>
+            <a:r>
+              <a:rPr lang="en-US" dirty="0" smtClean="0"/>
+              <a:t>Data flows in cycles</a:t>
+            </a:r>
+          </a:p>
+          <a:p>
+            <a:pPr lvl="1"/>
+            <a:r>
+              <a:rPr lang="en-US" dirty="0" smtClean="0"/>
+              <a:t>Static parts of a loop are optimized</a:t>
+            </a:r>
+            <a:endParaRPr lang="en-US" dirty="0" smtClean="0"/>
+          </a:p>
+          <a:p>
+            <a:pPr lvl="1"/>
+            <a:endParaRPr lang="en-US" dirty="0"/>
           </a:p>
         </p:txBody>
       </p:sp>
@@ -5162,30 +6832,18 @@
           <a:lstStyle/>
           <a:p>
             <a:fld id="{B07C5D84-2227-C144-B485-A8CA33CE4230}" type="slidenum">
-              <a:rPr lang="en-US" smtClean="0">
-                <a:solidFill>
-                  <a:prstClr val="black">
-                    <a:tint val="75000"/>
-                  </a:prstClr>
-                </a:solidFill>
-              </a:rPr>
+              <a:rPr lang="en-US" smtClean="0"/>
               <a:pPr/>
               <a:t>8</a:t>
             </a:fld>
-            <a:endParaRPr lang="en-US">
-              <a:solidFill>
-                <a:prstClr val="black">
-                  <a:tint val="75000"/>
-                </a:prstClr>
-              </a:solidFill>
-            </a:endParaRPr>
+            <a:endParaRPr lang="en-US"/>
           </a:p>
         </p:txBody>
       </p:sp>
     </p:spTree>
     <p:extLst>
       <p:ext uri="{BB962C8B-B14F-4D97-AF65-F5344CB8AC3E}">
-        <p14:creationId xmlns:p14="http://schemas.microsoft.com/office/powerpoint/2010/main" val="1848857036"/>
+        <p14:creationId xmlns:p14="http://schemas.microsoft.com/office/powerpoint/2010/main" val="156726280"/>
       </p:ext>
     </p:extLst>
   </p:cSld>
@@ -5227,7 +6885,11 @@
           <a:bodyPr/>
           <a:lstStyle/>
           <a:p>
-            <a:endParaRPr lang="en-US"/>
+            <a:r>
+              <a:rPr lang="en-US" dirty="0" err="1" smtClean="0"/>
+              <a:t>Gelly</a:t>
+            </a:r>
+            <a:endParaRPr lang="en-US" dirty="0"/>
           </a:p>
         </p:txBody>
       </p:sp>
@@ -5243,29 +6905,132 @@
         </p:nvSpPr>
         <p:spPr/>
         <p:txBody>
-          <a:bodyPr/>
-          <a:lstStyle/>
-          <a:p>
-            <a:r>
-              <a:rPr lang="en-US" dirty="0" smtClean="0"/>
-              <a:t>Cluster</a:t>
-            </a:r>
-          </a:p>
-          <a:p>
-            <a:r>
-              <a:rPr lang="en-US" dirty="0" smtClean="0"/>
-              <a:t>YARN (incl. Amazon EMR)</a:t>
-            </a:r>
-          </a:p>
-          <a:p>
+          <a:bodyPr>
+            <a:normAutofit fontScale="92500" lnSpcReduction="20000"/>
+          </a:bodyPr>
+          <a:lstStyle/>
+          <a:p>
+            <a:r>
+              <a:rPr lang="en-US" dirty="0" smtClean="0"/>
+              <a:t>API and library for Graph analysis</a:t>
+            </a:r>
+          </a:p>
+          <a:p>
+            <a:pPr lvl="1"/>
+            <a:r>
+              <a:rPr lang="en-US" dirty="0" smtClean="0"/>
+              <a:t>Offers primitives for graph processing</a:t>
+            </a:r>
+          </a:p>
+          <a:p>
+            <a:pPr lvl="1"/>
+            <a:r>
+              <a:rPr lang="en-US" dirty="0" smtClean="0"/>
+              <a:t>And graph processing algorithms</a:t>
+            </a:r>
+          </a:p>
+          <a:p>
+            <a:pPr lvl="1"/>
+            <a:endParaRPr lang="en-US" dirty="0" smtClean="0"/>
+          </a:p>
+          <a:p>
+            <a:r>
+              <a:rPr lang="en-US" dirty="0" smtClean="0"/>
+              <a:t>Builds on Java </a:t>
+            </a:r>
             <a:r>
               <a:rPr lang="en-US" dirty="0" err="1" smtClean="0"/>
-              <a:t>BDUtil</a:t>
-            </a:r>
-            <a:r>
-              <a:rPr lang="en-US" dirty="0" smtClean="0"/>
-              <a:t> for Google Cloud</a:t>
-            </a:r>
+              <a:t>DataSet</a:t>
+            </a:r>
+            <a:r>
+              <a:rPr lang="en-US" dirty="0" smtClean="0"/>
+              <a:t> API</a:t>
+            </a:r>
+          </a:p>
+          <a:p>
+            <a:pPr lvl="1"/>
+            <a:r>
+              <a:rPr lang="en-US" dirty="0" err="1" smtClean="0"/>
+              <a:t>Scala</a:t>
+            </a:r>
+            <a:r>
+              <a:rPr lang="en-US" dirty="0" smtClean="0"/>
+              <a:t> </a:t>
+            </a:r>
+            <a:r>
+              <a:rPr lang="en-US" dirty="0" err="1" smtClean="0"/>
+              <a:t>DataSet</a:t>
+            </a:r>
+            <a:r>
+              <a:rPr lang="en-US" dirty="0" smtClean="0"/>
+              <a:t> API </a:t>
+            </a:r>
+            <a:r>
+              <a:rPr lang="en-US" dirty="0" smtClean="0"/>
+              <a:t>is </a:t>
+            </a:r>
+            <a:r>
+              <a:rPr lang="en-US" dirty="0" err="1" smtClean="0"/>
+              <a:t>WiP</a:t>
+            </a:r>
+            <a:endParaRPr lang="en-US" dirty="0" smtClean="0"/>
+          </a:p>
+          <a:p>
+            <a:pPr lvl="1"/>
+            <a:endParaRPr lang="en-US" dirty="0" smtClean="0"/>
+          </a:p>
+          <a:p>
+            <a:r>
+              <a:rPr lang="en-US" dirty="0" smtClean="0"/>
+              <a:t>Seamless integration with </a:t>
+            </a:r>
+            <a:r>
+              <a:rPr lang="en-US" dirty="0" err="1" smtClean="0"/>
+              <a:t>DataSet</a:t>
+            </a:r>
+            <a:r>
+              <a:rPr lang="en-US" dirty="0" smtClean="0"/>
+              <a:t> API</a:t>
+            </a:r>
+          </a:p>
+          <a:p>
+            <a:pPr lvl="1"/>
+            <a:r>
+              <a:rPr lang="en-US" dirty="0" smtClean="0"/>
+              <a:t>Preprocess your data with </a:t>
+            </a:r>
+            <a:r>
+              <a:rPr lang="en-US" dirty="0" err="1" smtClean="0"/>
+              <a:t>DataSet</a:t>
+            </a:r>
+            <a:r>
+              <a:rPr lang="en-US" dirty="0" smtClean="0"/>
+              <a:t> API</a:t>
+            </a:r>
+          </a:p>
+          <a:p>
+            <a:pPr lvl="1"/>
+            <a:r>
+              <a:rPr lang="en-US" dirty="0" smtClean="0"/>
+              <a:t>Transform into graph &amp; analyze</a:t>
+            </a:r>
+          </a:p>
+          <a:p>
+            <a:pPr lvl="1"/>
+            <a:r>
+              <a:rPr lang="en-US" dirty="0" smtClean="0"/>
+              <a:t>Continue processing with </a:t>
+            </a:r>
+            <a:r>
+              <a:rPr lang="en-US" dirty="0" err="1" smtClean="0"/>
+              <a:t>DataSet</a:t>
+            </a:r>
+            <a:r>
+              <a:rPr lang="en-US" dirty="0" smtClean="0"/>
+              <a:t> API</a:t>
+            </a:r>
+          </a:p>
+          <a:p>
             <a:endParaRPr lang="en-US" dirty="0"/>
           </a:p>
         </p:txBody>
@@ -5297,7 +7062,7 @@
     </p:spTree>
     <p:extLst>
       <p:ext uri="{BB962C8B-B14F-4D97-AF65-F5344CB8AC3E}">
-        <p14:creationId xmlns:p14="http://schemas.microsoft.com/office/powerpoint/2010/main" val="631382542"/>
+        <p14:creationId xmlns:p14="http://schemas.microsoft.com/office/powerpoint/2010/main" val="898574083"/>
       </p:ext>
     </p:extLst>
   </p:cSld>

</xml_diff>

<commit_message>
slides: add logo and date to title slide
</commit_message>
<xml_diff>
--- a/slides/closing.pptx
+++ b/slides/closing.pptx
@@ -811,6 +811,36 @@
           <a:xfrm>
             <a:off x="8022838" y="382257"/>
             <a:ext cx="663961" cy="660641"/>
+          </a:xfrm>
+          <a:prstGeom prst="rect">
+            <a:avLst/>
+          </a:prstGeom>
+        </p:spPr>
+      </p:pic>
+      <p:pic>
+        <p:nvPicPr>
+          <p:cNvPr id="7" name="Picture 6" descr="logo.png"/>
+          <p:cNvPicPr>
+            <a:picLocks noChangeAspect="1"/>
+          </p:cNvPicPr>
+          <p:nvPr userDrawn="1"/>
+        </p:nvPicPr>
+        <p:blipFill>
+          <a:blip r:embed="rId4">
+            <a:extLst>
+              <a:ext uri="{28A0092B-C50C-407E-A947-70E740481C1C}">
+                <a14:useLocalDpi xmlns:a14="http://schemas.microsoft.com/office/drawing/2010/main" val="0"/>
+              </a:ext>
+            </a:extLst>
+          </a:blip>
+          <a:stretch>
+            <a:fillRect/>
+          </a:stretch>
+        </p:blipFill>
+        <p:spPr>
+          <a:xfrm>
+            <a:off x="2728719" y="331587"/>
+            <a:ext cx="3695140" cy="577365"/>
           </a:xfrm>
           <a:prstGeom prst="rect">
             <a:avLst/>
@@ -4136,6 +4166,44 @@
           </a:p>
         </p:txBody>
       </p:sp>
+      <p:sp>
+        <p:nvSpPr>
+          <p:cNvPr id="4" name="TextBox 3"/>
+          <p:cNvSpPr txBox="1"/>
+          <p:nvPr/>
+        </p:nvSpPr>
+        <p:spPr>
+          <a:xfrm>
+            <a:off x="3819004" y="6226328"/>
+            <a:ext cx="1564363" cy="369332"/>
+          </a:xfrm>
+          <a:prstGeom prst="rect">
+            <a:avLst/>
+          </a:prstGeom>
+          <a:noFill/>
+        </p:spPr>
+        <p:txBody>
+          <a:bodyPr wrap="none" rtlCol="0">
+            <a:spAutoFit/>
+          </a:bodyPr>
+          <a:lstStyle/>
+          <a:p>
+            <a:r>
+              <a:rPr lang="en-US" dirty="0" smtClean="0">
+                <a:solidFill>
+                  <a:schemeClr val="bg1"/>
+                </a:solidFill>
+              </a:rPr>
+              <a:t>June 3rd, 2015</a:t>
+            </a:r>
+            <a:endParaRPr lang="en-US" dirty="0">
+              <a:solidFill>
+                <a:schemeClr val="bg1"/>
+              </a:solidFill>
+            </a:endParaRPr>
+          </a:p>
+        </p:txBody>
+      </p:sp>
     </p:spTree>
     <p:extLst>
       <p:ext uri="{BB962C8B-B14F-4D97-AF65-F5344CB8AC3E}">
@@ -4881,11 +4949,7 @@
             </a:r>
             <a:r>
               <a:rPr lang="en-US" dirty="0" smtClean="0"/>
-              <a:t> for Google </a:t>
-            </a:r>
-            <a:r>
-              <a:rPr lang="en-US" dirty="0" smtClean="0"/>
-              <a:t>Cloud</a:t>
+              <a:t> for Google Cloud</a:t>
             </a:r>
           </a:p>
           <a:p>
@@ -5024,13 +5088,8 @@
           <a:p>
             <a:r>
               <a:rPr lang="en-US" dirty="0" smtClean="0"/>
-              <a:t>Distributed cluster </a:t>
-            </a:r>
-            <a:r>
-              <a:rPr lang="en-US" dirty="0" smtClean="0"/>
-              <a:t>execution</a:t>
-            </a:r>
-            <a:endParaRPr lang="en-US" dirty="0" smtClean="0"/>
+              <a:t>Distributed cluster execution</a:t>
+            </a:r>
           </a:p>
           <a:p>
             <a:pPr lvl="1"/>
@@ -5284,13 +5343,8 @@
           <a:p>
             <a:r>
               <a:rPr lang="en-US" dirty="0" smtClean="0"/>
-              <a:t>Flexible window </a:t>
-            </a:r>
-            <a:r>
-              <a:rPr lang="en-US" dirty="0" smtClean="0"/>
-              <a:t>operations</a:t>
-            </a:r>
-            <a:endParaRPr lang="en-US" dirty="0" smtClean="0"/>
+              <a:t>Flexible window operations</a:t>
+            </a:r>
           </a:p>
         </p:txBody>
       </p:sp>
@@ -6316,21 +6370,8 @@
           <a:p>
             <a:r>
               <a:rPr lang="en-US" dirty="0" smtClean="0"/>
-              <a:t>Flink offers more </a:t>
-            </a:r>
-            <a:r>
-              <a:rPr lang="en-US" dirty="0" smtClean="0"/>
-              <a:t>APIs </a:t>
-            </a:r>
-            <a:r>
-              <a:rPr lang="en-US" dirty="0" smtClean="0"/>
-              <a:t>than </a:t>
-            </a:r>
-            <a:r>
-              <a:rPr lang="en-US" dirty="0" smtClean="0"/>
-              <a:t>we covered</a:t>
-            </a:r>
-            <a:endParaRPr lang="en-US" dirty="0" smtClean="0"/>
+              <a:t>Flink offers more APIs than we covered</a:t>
+            </a:r>
           </a:p>
           <a:p>
             <a:pPr lvl="1"/>
@@ -6364,13 +6405,8 @@
             <a:pPr lvl="1"/>
             <a:r>
               <a:rPr lang="en-US" dirty="0" smtClean="0"/>
-              <a:t>Python </a:t>
-            </a:r>
-            <a:r>
-              <a:rPr lang="en-US" dirty="0" smtClean="0"/>
-              <a:t>API</a:t>
-            </a:r>
-            <a:endParaRPr lang="en-US" dirty="0" smtClean="0"/>
+              <a:t>Python API</a:t>
+            </a:r>
           </a:p>
         </p:txBody>
       </p:sp>

</xml_diff>

<commit_message>
slides: modify last slides in closing
</commit_message>
<xml_diff>
--- a/slides/closing.pptx
+++ b/slides/closing.pptx
@@ -5,7 +5,7 @@
     <p:sldMasterId id="2147483660" r:id="rId1"/>
   </p:sldMasterIdLst>
   <p:notesMasterIdLst>
-    <p:notesMasterId r:id="rId17"/>
+    <p:notesMasterId r:id="rId18"/>
   </p:notesMasterIdLst>
   <p:sldIdLst>
     <p:sldId id="258" r:id="rId2"/>
@@ -21,8 +21,9 @@
     <p:sldId id="278" r:id="rId12"/>
     <p:sldId id="267" r:id="rId13"/>
     <p:sldId id="268" r:id="rId14"/>
-    <p:sldId id="269" r:id="rId15"/>
-    <p:sldId id="270" r:id="rId16"/>
+    <p:sldId id="282" r:id="rId15"/>
+    <p:sldId id="269" r:id="rId16"/>
+    <p:sldId id="270" r:id="rId17"/>
   </p:sldIdLst>
   <p:sldSz cx="9144000" cy="6858000" type="screen4x3"/>
   <p:notesSz cx="6858000" cy="9144000"/>
@@ -123,7 +124,7 @@
   </p:defaultTextStyle>
   <p:extLst>
     <p:ext uri="{EFAFB233-063F-42B5-8137-9DF3F51BA10A}">
-      <p15:sldGuideLst xmlns:p15="http://schemas.microsoft.com/office/powerpoint/2012/main" xmlns="">
+      <p15:sldGuideLst xmlns="" xmlns:p15="http://schemas.microsoft.com/office/powerpoint/2012/main">
         <p15:guide id="1" orient="horz" pos="2160">
           <p15:clr>
             <a:srgbClr val="A4A3A4"/>
@@ -4692,7 +4693,10 @@
           <a:bodyPr/>
           <a:lstStyle/>
           <a:p>
-            <a:endParaRPr lang="en-US"/>
+            <a:r>
+              <a:rPr lang="en-US" dirty="0"/>
+              <a:t>Apache Zeppelin</a:t>
+            </a:r>
           </a:p>
         </p:txBody>
       </p:sp>
@@ -4711,26 +4715,6 @@
           <a:bodyPr/>
           <a:lstStyle/>
           <a:p>
-            <a:r>
-              <a:rPr lang="en-US" dirty="0" smtClean="0"/>
-              <a:t>Apache Zeppelin</a:t>
-            </a:r>
-          </a:p>
-          <a:p>
-            <a:r>
-              <a:rPr lang="en-US" dirty="0" err="1" smtClean="0"/>
-              <a:t>Scala</a:t>
-            </a:r>
-            <a:r>
-              <a:rPr lang="en-US" dirty="0" smtClean="0"/>
-              <a:t> REPL</a:t>
-            </a:r>
-          </a:p>
-          <a:p>
-            <a:r>
-              <a:rPr lang="en-US" dirty="0" smtClean="0"/>
-              <a:t>Result caching (WIP)</a:t>
-            </a:r>
             <a:endParaRPr lang="en-US" dirty="0"/>
           </a:p>
         </p:txBody>
@@ -4759,6 +4743,36 @@
           </a:p>
         </p:txBody>
       </p:sp>
+      <p:pic>
+        <p:nvPicPr>
+          <p:cNvPr id="2" name="Picture 1" descr="zeppelin.png"/>
+          <p:cNvPicPr>
+            <a:picLocks noChangeAspect="1"/>
+          </p:cNvPicPr>
+          <p:nvPr/>
+        </p:nvPicPr>
+        <p:blipFill>
+          <a:blip r:embed="rId2">
+            <a:extLst>
+              <a:ext uri="{28A0092B-C50C-407E-A947-70E740481C1C}">
+                <a14:useLocalDpi xmlns:a14="http://schemas.microsoft.com/office/drawing/2010/main" val="0"/>
+              </a:ext>
+            </a:extLst>
+          </a:blip>
+          <a:stretch>
+            <a:fillRect/>
+          </a:stretch>
+        </p:blipFill>
+        <p:spPr>
+          <a:xfrm>
+            <a:off x="732385" y="1322672"/>
+            <a:ext cx="6714389" cy="5438262"/>
+          </a:xfrm>
+          <a:prstGeom prst="rect">
+            <a:avLst/>
+          </a:prstGeom>
+        </p:spPr>
+      </p:pic>
     </p:spTree>
     <p:extLst>
       <p:ext uri="{BB962C8B-B14F-4D97-AF65-F5344CB8AC3E}">
@@ -4791,7 +4805,7 @@
       </p:grpSpPr>
       <p:sp>
         <p:nvSpPr>
-          <p:cNvPr id="5" name="Title 4"/>
+          <p:cNvPr id="2" name="Title 1"/>
           <p:cNvSpPr>
             <a:spLocks noGrp="1"/>
           </p:cNvSpPr>
@@ -4805,8 +4819,16 @@
           <a:lstStyle/>
           <a:p>
             <a:r>
-              <a:rPr lang="en-US" dirty="0" smtClean="0"/>
-              <a:t>Distributed Setups</a:t>
+              <a:rPr lang="en-US" dirty="0" err="1" smtClean="0"/>
+              <a:t>Scala</a:t>
+            </a:r>
+            <a:r>
+              <a:rPr lang="en-US" dirty="0" smtClean="0"/>
+              <a:t> </a:t>
+            </a:r>
+            <a:r>
+              <a:rPr lang="en-US" dirty="0" err="1" smtClean="0"/>
+              <a:t>Repl</a:t>
             </a:r>
             <a:endParaRPr lang="en-US" dirty="0"/>
           </a:p>
@@ -4814,12 +4836,12 @@
       </p:sp>
       <p:sp>
         <p:nvSpPr>
-          <p:cNvPr id="6" name="Text Placeholder 5"/>
-          <p:cNvSpPr>
-            <a:spLocks noGrp="1"/>
-          </p:cNvSpPr>
-          <p:nvPr>
-            <p:ph type="body" idx="1"/>
+          <p:cNvPr id="3" name="Content Placeholder 2"/>
+          <p:cNvSpPr>
+            <a:spLocks noGrp="1"/>
+          </p:cNvSpPr>
+          <p:nvPr>
+            <p:ph idx="1"/>
           </p:nvPr>
         </p:nvSpPr>
         <p:spPr/>
@@ -4827,7 +4849,69 @@
           <a:bodyPr/>
           <a:lstStyle/>
           <a:p>
-            <a:endParaRPr lang="en-US"/>
+            <a:r>
+              <a:rPr lang="en-US" dirty="0" smtClean="0"/>
+              <a:t>./bin/start-</a:t>
+            </a:r>
+            <a:r>
+              <a:rPr lang="en-US" dirty="0" err="1" smtClean="0"/>
+              <a:t>scala</a:t>
+            </a:r>
+            <a:r>
+              <a:rPr lang="en-US" dirty="0" smtClean="0"/>
+              <a:t>-</a:t>
+            </a:r>
+            <a:r>
+              <a:rPr lang="en-US" dirty="0" err="1" smtClean="0"/>
+              <a:t>shell.sh</a:t>
+            </a:r>
+            <a:endParaRPr lang="en-US" dirty="0" smtClean="0"/>
+          </a:p>
+          <a:p>
+            <a:r>
+              <a:rPr lang="en-US" dirty="0" smtClean="0"/>
+              <a:t>Complete </a:t>
+            </a:r>
+            <a:r>
+              <a:rPr lang="en-US" dirty="0" err="1" smtClean="0"/>
+              <a:t>Scala</a:t>
+            </a:r>
+            <a:r>
+              <a:rPr lang="en-US" dirty="0" smtClean="0"/>
+              <a:t> API available</a:t>
+            </a:r>
+          </a:p>
+          <a:p>
+            <a:r>
+              <a:rPr lang="en-US" dirty="0"/>
+              <a:t>Syntax </a:t>
+            </a:r>
+            <a:r>
+              <a:rPr lang="en-US" dirty="0" smtClean="0"/>
+              <a:t>completion</a:t>
+            </a:r>
+          </a:p>
+          <a:p>
+            <a:r>
+              <a:rPr lang="en-US" dirty="0" smtClean="0"/>
+              <a:t>Build your jobs incrementally</a:t>
+            </a:r>
+            <a:endParaRPr lang="en-US" dirty="0"/>
+          </a:p>
+          <a:p>
+            <a:r>
+              <a:rPr lang="en-US" dirty="0" smtClean="0"/>
+              <a:t>Upcoming: </a:t>
+            </a:r>
+            <a:r>
+              <a:rPr lang="en-US" dirty="0"/>
+              <a:t>Caching of intermediate results (WIP</a:t>
+            </a:r>
+            <a:r>
+              <a:rPr lang="en-US" dirty="0" smtClean="0"/>
+              <a:t>)</a:t>
+            </a:r>
+            <a:endParaRPr lang="en-US" dirty="0"/>
           </a:p>
         </p:txBody>
       </p:sp>
@@ -4870,7 +4954,7 @@
     </p:spTree>
     <p:extLst>
       <p:ext uri="{BB962C8B-B14F-4D97-AF65-F5344CB8AC3E}">
-        <p14:creationId xmlns:p14="http://schemas.microsoft.com/office/powerpoint/2010/main" val="1848857036"/>
+        <p14:creationId xmlns:p14="http://schemas.microsoft.com/office/powerpoint/2010/main" val="3991023111"/>
       </p:ext>
     </p:extLst>
   </p:cSld>
@@ -4912,12 +4996,128 @@
           <a:bodyPr/>
           <a:lstStyle/>
           <a:p>
+            <a:r>
+              <a:rPr lang="en-US" dirty="0" smtClean="0"/>
+              <a:t>Distributed Setups</a:t>
+            </a:r>
+            <a:endParaRPr lang="en-US" dirty="0"/>
+          </a:p>
+        </p:txBody>
+      </p:sp>
+      <p:sp>
+        <p:nvSpPr>
+          <p:cNvPr id="6" name="Text Placeholder 5"/>
+          <p:cNvSpPr>
+            <a:spLocks noGrp="1"/>
+          </p:cNvSpPr>
+          <p:nvPr>
+            <p:ph type="body" idx="1"/>
+          </p:nvPr>
+        </p:nvSpPr>
+        <p:spPr/>
+        <p:txBody>
+          <a:bodyPr/>
+          <a:lstStyle/>
+          <a:p>
             <a:endParaRPr lang="en-US"/>
           </a:p>
         </p:txBody>
       </p:sp>
       <p:sp>
         <p:nvSpPr>
+          <p:cNvPr id="4" name="Slide Number Placeholder 3"/>
+          <p:cNvSpPr>
+            <a:spLocks noGrp="1"/>
+          </p:cNvSpPr>
+          <p:nvPr>
+            <p:ph type="sldNum" sz="quarter" idx="12"/>
+          </p:nvPr>
+        </p:nvSpPr>
+        <p:spPr/>
+        <p:txBody>
+          <a:bodyPr/>
+          <a:lstStyle/>
+          <a:p>
+            <a:fld id="{B07C5D84-2227-C144-B485-A8CA33CE4230}" type="slidenum">
+              <a:rPr lang="en-US" smtClean="0">
+                <a:solidFill>
+                  <a:prstClr val="black">
+                    <a:tint val="75000"/>
+                  </a:prstClr>
+                </a:solidFill>
+              </a:rPr>
+              <a:pPr/>
+              <a:t>15</a:t>
+            </a:fld>
+            <a:endParaRPr lang="en-US">
+              <a:solidFill>
+                <a:prstClr val="black">
+                  <a:tint val="75000"/>
+                </a:prstClr>
+              </a:solidFill>
+            </a:endParaRPr>
+          </a:p>
+        </p:txBody>
+      </p:sp>
+    </p:spTree>
+    <p:extLst>
+      <p:ext uri="{BB962C8B-B14F-4D97-AF65-F5344CB8AC3E}">
+        <p14:creationId xmlns:p14="http://schemas.microsoft.com/office/powerpoint/2010/main" val="1848857036"/>
+      </p:ext>
+    </p:extLst>
+  </p:cSld>
+  <p:clrMapOvr>
+    <a:masterClrMapping/>
+  </p:clrMapOvr>
+</p:sld>
+</file>
+
+<file path=ppt/slides/slide16.xml><?xml version="1.0" encoding="utf-8"?>
+<p:sld xmlns:a="http://schemas.openxmlformats.org/drawingml/2006/main" xmlns:r="http://schemas.openxmlformats.org/officeDocument/2006/relationships" xmlns:p="http://schemas.openxmlformats.org/presentationml/2006/main">
+  <p:cSld>
+    <p:spTree>
+      <p:nvGrpSpPr>
+        <p:cNvPr id="1" name=""/>
+        <p:cNvGrpSpPr/>
+        <p:nvPr/>
+      </p:nvGrpSpPr>
+      <p:grpSpPr>
+        <a:xfrm>
+          <a:off x="0" y="0"/>
+          <a:ext cx="0" cy="0"/>
+          <a:chOff x="0" y="0"/>
+          <a:chExt cx="0" cy="0"/>
+        </a:xfrm>
+      </p:grpSpPr>
+      <p:sp>
+        <p:nvSpPr>
+          <p:cNvPr id="5" name="Title 4"/>
+          <p:cNvSpPr>
+            <a:spLocks noGrp="1"/>
+          </p:cNvSpPr>
+          <p:nvPr>
+            <p:ph type="title"/>
+          </p:nvPr>
+        </p:nvSpPr>
+        <p:spPr/>
+        <p:txBody>
+          <a:bodyPr/>
+          <a:lstStyle/>
+          <a:p>
+            <a:r>
+              <a:rPr lang="en-US" dirty="0" err="1" smtClean="0"/>
+              <a:t>Flink</a:t>
+            </a:r>
+            <a:r>
+              <a:rPr lang="en-US" dirty="0" smtClean="0"/>
+              <a:t> in the Cloud	</a:t>
+            </a:r>
+            <a:endParaRPr lang="en-US" dirty="0"/>
+          </a:p>
+        </p:txBody>
+      </p:sp>
+      <p:sp>
+        <p:nvSpPr>
           <p:cNvPr id="6" name="Content Placeholder 5"/>
           <p:cNvSpPr>
             <a:spLocks noGrp="1"/>
@@ -4933,8 +5133,9 @@
           <a:p>
             <a:r>
               <a:rPr lang="en-US" dirty="0" smtClean="0"/>
-              <a:t>Cluster</a:t>
-            </a:r>
+              <a:t>Standalone, but also</a:t>
+            </a:r>
+            <a:endParaRPr lang="en-US" dirty="0" smtClean="0"/>
           </a:p>
           <a:p>
             <a:r>
@@ -4944,21 +5145,48 @@
           </a:p>
           <a:p>
             <a:r>
+              <a:rPr lang="en-US" dirty="0" err="1"/>
+              <a:t>b</a:t>
+            </a:r>
+            <a:r>
               <a:rPr lang="en-US" dirty="0" err="1" smtClean="0"/>
-              <a:t>BDUtil</a:t>
-            </a:r>
-            <a:r>
-              <a:rPr lang="en-US" dirty="0" smtClean="0"/>
-              <a:t> for Google Cloud</a:t>
-            </a:r>
-          </a:p>
-          <a:p>
-            <a:endParaRPr lang="en-US" dirty="0"/>
-          </a:p>
-          <a:p>
-            <a:r>
-              <a:rPr lang="en-US" dirty="0" smtClean="0"/>
-              <a:t>Just drop links </a:t>
+              <a:t>dutil</a:t>
+            </a:r>
+            <a:r>
+              <a:rPr lang="en-US" dirty="0" smtClean="0"/>
+              <a:t> for </a:t>
+            </a:r>
+            <a:r>
+              <a:rPr lang="en-US" dirty="0" smtClean="0"/>
+              <a:t>Google </a:t>
+            </a:r>
+            <a:r>
+              <a:rPr lang="en-US" dirty="0" smtClean="0"/>
+              <a:t>Compute Engine</a:t>
+            </a:r>
+            <a:endParaRPr lang="en-US" dirty="0" smtClean="0"/>
+          </a:p>
+          <a:p>
+            <a:endParaRPr lang="en-US" dirty="0" smtClean="0"/>
+          </a:p>
+          <a:p>
+            <a:r>
+              <a:rPr lang="en-US" dirty="0" smtClean="0">
+                <a:sym typeface="Wingdings"/>
+              </a:rPr>
+              <a:t> </a:t>
+            </a:r>
+            <a:r>
+              <a:rPr lang="en-US" dirty="0" err="1" smtClean="0">
+                <a:sym typeface="Wingdings"/>
+              </a:rPr>
+              <a:t>flink.apache.org</a:t>
+            </a:r>
+            <a:r>
+              <a:rPr lang="en-US" dirty="0" smtClean="0">
+                <a:sym typeface="Wingdings"/>
+              </a:rPr>
+              <a:t>/docs/</a:t>
             </a:r>
             <a:endParaRPr lang="en-US" dirty="0"/>
           </a:p>
@@ -4982,7 +5210,7 @@
             <a:fld id="{B07C5D84-2227-C144-B485-A8CA33CE4230}" type="slidenum">
               <a:rPr lang="en-US" smtClean="0"/>
               <a:pPr/>
-              <a:t>15</a:t>
+              <a:t>16</a:t>
             </a:fld>
             <a:endParaRPr lang="en-US"/>
           </a:p>

</xml_diff>

<commit_message>
Updated slides, added PDF slides, and download links
</commit_message>
<xml_diff>
--- a/slides/closing.pptx
+++ b/slides/closing.pptx
@@ -127,7 +127,7 @@
   </p:defaultTextStyle>
   <p:extLst>
     <p:ext uri="{EFAFB233-063F-42B5-8137-9DF3F51BA10A}">
-      <p15:sldGuideLst xmlns="" xmlns:p15="http://schemas.microsoft.com/office/powerpoint/2012/main">
+      <p15:sldGuideLst xmlns:p15="http://schemas.microsoft.com/office/powerpoint/2012/main" xmlns="">
         <p15:guide id="1" orient="horz" pos="2160">
           <p15:clr>
             <a:srgbClr val="A4A3A4"/>
@@ -226,7 +226,7 @@
           <a:p>
             <a:fld id="{F01141F9-3E73-7448-86C2-E96D93FE379F}" type="datetimeFigureOut">
               <a:rPr lang="en-US" smtClean="0"/>
-              <a:t>02/06/15</a:t>
+              <a:t>01/09/15</a:t>
             </a:fld>
             <a:endParaRPr lang="en-US"/>
           </a:p>
@@ -7350,7 +7350,12 @@
             <p:ph idx="1"/>
           </p:nvPr>
         </p:nvSpPr>
-        <p:spPr/>
+        <p:spPr>
+          <a:xfrm>
+            <a:off x="457200" y="1474376"/>
+            <a:ext cx="8229600" cy="4651788"/>
+          </a:xfrm>
+        </p:spPr>
         <p:txBody>
           <a:bodyPr>
             <a:normAutofit/>
@@ -7370,7 +7375,21 @@
             </a:r>
             <a:r>
               <a:rPr lang="en-US" dirty="0" smtClean="0"/>
-              <a:t> Iterations</a:t>
+              <a:t> API for batch processing</a:t>
+            </a:r>
+          </a:p>
+          <a:p>
+            <a:pPr lvl="1"/>
+            <a:r>
+              <a:rPr lang="en-US" dirty="0" smtClean="0"/>
+              <a:t>DataStream Iterations</a:t>
+            </a:r>
+          </a:p>
+          <a:p>
+            <a:pPr lvl="1"/>
+            <a:r>
+              <a:rPr lang="en-US" dirty="0" smtClean="0"/>
+              <a:t>Table API</a:t>
             </a:r>
             <a:endParaRPr lang="en-US" dirty="0"/>
           </a:p>

</xml_diff>

<commit_message>
[slides] update to 1.0.0 changes
</commit_message>
<xml_diff>
--- a/slides/closing.pptx
+++ b/slides/closing.pptx
@@ -226,7 +226,7 @@
           <a:p>
             <a:fld id="{F01141F9-3E73-7448-86C2-E96D93FE379F}" type="datetimeFigureOut">
               <a:rPr lang="en-US" smtClean="0"/>
-              <a:t>01/09/15</a:t>
+              <a:t>29/03/16</a:t>
             </a:fld>
             <a:endParaRPr lang="en-US"/>
           </a:p>
@@ -6637,59 +6637,121 @@
                 <a:latin typeface="Courier New" panose="02070309020205020404" pitchFamily="49" charset="0"/>
                 <a:cs typeface="Courier New" panose="02070309020205020404" pitchFamily="49" charset="0"/>
               </a:rPr>
-              <a:t>(word,1))}  </a:t>
-            </a:r>
-          </a:p>
-          <a:p>
+              <a:t>(word,1))}</a:t>
+            </a:r>
+          </a:p>
+          <a:p>
+            <a:r>
+              <a:rPr lang="en-US" dirty="0">
+                <a:latin typeface="Courier New" panose="02070309020205020404" pitchFamily="49" charset="0"/>
+                <a:cs typeface="Courier New" panose="02070309020205020404" pitchFamily="49" charset="0"/>
+              </a:rPr>
+              <a:t> </a:t>
+            </a:r>
             <a:r>
               <a:rPr lang="en-US" dirty="0" smtClean="0">
                 <a:latin typeface="Courier New" panose="02070309020205020404" pitchFamily="49" charset="0"/>
                 <a:cs typeface="Courier New" panose="02070309020205020404" pitchFamily="49" charset="0"/>
               </a:rPr>
-              <a:t>     .</a:t>
-            </a:r>
-            <a:r>
-              <a:rPr lang="en-US" b="1" dirty="0" smtClean="0">
+              <a:t>    .</a:t>
+            </a:r>
+            <a:r>
+              <a:rPr lang="en-US" b="1" dirty="0" err="1" smtClean="0">
                 <a:solidFill>
                   <a:schemeClr val="accent2"/>
                 </a:solidFill>
                 <a:latin typeface="Courier New" panose="02070309020205020404" pitchFamily="49" charset="0"/>
                 <a:cs typeface="Courier New" panose="02070309020205020404" pitchFamily="49" charset="0"/>
               </a:rPr>
-              <a:t>window</a:t>
+              <a:t>keyBy</a:t>
             </a:r>
             <a:r>
               <a:rPr lang="en-US" dirty="0" smtClean="0">
                 <a:latin typeface="Courier New" panose="02070309020205020404" pitchFamily="49" charset="0"/>
                 <a:cs typeface="Courier New" panose="02070309020205020404" pitchFamily="49" charset="0"/>
               </a:rPr>
-              <a:t>(Count.of(1000)).</a:t>
+              <a:t>(</a:t>
+            </a:r>
+            <a:r>
+              <a:rPr lang="en-US" b="1" dirty="0">
+                <a:solidFill>
+                  <a:schemeClr val="accent1"/>
+                </a:solidFill>
+                <a:latin typeface="Courier New" panose="02070309020205020404" pitchFamily="49" charset="0"/>
+                <a:cs typeface="Courier New" panose="02070309020205020404" pitchFamily="49" charset="0"/>
+              </a:rPr>
+              <a:t>"</a:t>
             </a:r>
             <a:r>
               <a:rPr lang="en-US" b="1" dirty="0" smtClean="0">
+                <a:solidFill>
+                  <a:schemeClr val="accent1"/>
+                </a:solidFill>
+                <a:latin typeface="Courier New" panose="02070309020205020404" pitchFamily="49" charset="0"/>
+                <a:cs typeface="Courier New" panose="02070309020205020404" pitchFamily="49" charset="0"/>
+              </a:rPr>
+              <a:t>word”</a:t>
+            </a:r>
+            <a:r>
+              <a:rPr lang="en-US" dirty="0" smtClean="0">
+                <a:latin typeface="Courier New" panose="02070309020205020404" pitchFamily="49" charset="0"/>
+                <a:cs typeface="Courier New" panose="02070309020205020404" pitchFamily="49" charset="0"/>
+              </a:rPr>
+              <a:t>)</a:t>
+            </a:r>
+          </a:p>
+          <a:p>
+            <a:r>
+              <a:rPr lang="en-US" dirty="0">
+                <a:latin typeface="Courier New" panose="02070309020205020404" pitchFamily="49" charset="0"/>
+                <a:cs typeface="Courier New" panose="02070309020205020404" pitchFamily="49" charset="0"/>
+              </a:rPr>
+              <a:t> </a:t>
+            </a:r>
+            <a:r>
+              <a:rPr lang="en-US" dirty="0" smtClean="0">
+                <a:latin typeface="Courier New" panose="02070309020205020404" pitchFamily="49" charset="0"/>
+                <a:cs typeface="Courier New" panose="02070309020205020404" pitchFamily="49" charset="0"/>
+              </a:rPr>
+              <a:t>    </a:t>
+            </a:r>
+            <a:r>
+              <a:rPr lang="en-US" dirty="0" smtClean="0">
+                <a:latin typeface="Courier New" panose="02070309020205020404" pitchFamily="49" charset="0"/>
+                <a:cs typeface="Courier New" panose="02070309020205020404" pitchFamily="49" charset="0"/>
+              </a:rPr>
+              <a:t>.</a:t>
+            </a:r>
+            <a:r>
+              <a:rPr lang="en-US" b="1" dirty="0" err="1" smtClean="0">
                 <a:solidFill>
                   <a:schemeClr val="accent2"/>
                 </a:solidFill>
                 <a:latin typeface="Courier New" panose="02070309020205020404" pitchFamily="49" charset="0"/>
                 <a:cs typeface="Courier New" panose="02070309020205020404" pitchFamily="49" charset="0"/>
               </a:rPr>
-              <a:t>every</a:t>
+              <a:t>countWindow</a:t>
             </a:r>
             <a:r>
               <a:rPr lang="en-US" dirty="0" smtClean="0">
                 <a:latin typeface="Courier New" panose="02070309020205020404" pitchFamily="49" charset="0"/>
                 <a:cs typeface="Courier New" panose="02070309020205020404" pitchFamily="49" charset="0"/>
               </a:rPr>
-              <a:t>(Count.of(100))</a:t>
-            </a:r>
-          </a:p>
-          <a:p>
+              <a:t>(1000, </a:t>
+            </a:r>
+            <a:r>
+              <a:rPr lang="en-US" dirty="0">
+                <a:latin typeface="Courier New" panose="02070309020205020404" pitchFamily="49" charset="0"/>
+                <a:cs typeface="Courier New" panose="02070309020205020404" pitchFamily="49" charset="0"/>
+              </a:rPr>
+              <a:t>100</a:t>
+            </a:r>
             <a:r>
               <a:rPr lang="en-US" dirty="0" smtClean="0">
                 <a:latin typeface="Courier New" panose="02070309020205020404" pitchFamily="49" charset="0"/>
                 <a:cs typeface="Courier New" panose="02070309020205020404" pitchFamily="49" charset="0"/>
               </a:rPr>
-              <a:t>     .</a:t>
+              <a:t>).</a:t>
             </a:r>
             <a:r>
               <a:rPr lang="en-US" b="1" dirty="0">
@@ -6699,14 +6761,24 @@
                 <a:latin typeface="Courier New" panose="02070309020205020404" pitchFamily="49" charset="0"/>
                 <a:cs typeface="Courier New" panose="02070309020205020404" pitchFamily="49" charset="0"/>
               </a:rPr>
-              <a:t>groupBy</a:t>
-            </a:r>
-            <a:r>
-              <a:rPr lang="en-US" dirty="0" smtClean="0">
+              <a:t>sum</a:t>
+            </a:r>
+            <a:r>
+              <a:rPr lang="en-US" dirty="0">
                 <a:latin typeface="Courier New" panose="02070309020205020404" pitchFamily="49" charset="0"/>
                 <a:cs typeface="Courier New" panose="02070309020205020404" pitchFamily="49" charset="0"/>
               </a:rPr>
               <a:t>(</a:t>
+            </a:r>
+            <a:r>
+              <a:rPr lang="en-US" b="1" dirty="0">
+                <a:solidFill>
+                  <a:schemeClr val="accent1"/>
+                </a:solidFill>
+                <a:latin typeface="Courier New" panose="02070309020205020404" pitchFamily="49" charset="0"/>
+                <a:cs typeface="Courier New" panose="02070309020205020404" pitchFamily="49" charset="0"/>
+              </a:rPr>
+              <a:t>"</a:t>
             </a:r>
             <a:r>
               <a:rPr lang="en-US" b="1" dirty="0" smtClean="0">
@@ -6716,67 +6788,34 @@
                 <a:latin typeface="Courier New" panose="02070309020205020404" pitchFamily="49" charset="0"/>
                 <a:cs typeface="Courier New" panose="02070309020205020404" pitchFamily="49" charset="0"/>
               </a:rPr>
-              <a:t>"word"</a:t>
+              <a:t>count”</a:t>
             </a:r>
             <a:r>
               <a:rPr lang="en-US" dirty="0" smtClean="0">
                 <a:latin typeface="Courier New" panose="02070309020205020404" pitchFamily="49" charset="0"/>
                 <a:cs typeface="Courier New" panose="02070309020205020404" pitchFamily="49" charset="0"/>
               </a:rPr>
-              <a:t>).</a:t>
-            </a:r>
-            <a:r>
-              <a:rPr lang="en-US" b="1" dirty="0">
-                <a:solidFill>
-                  <a:schemeClr val="accent2"/>
-                </a:solidFill>
-                <a:latin typeface="Courier New" panose="02070309020205020404" pitchFamily="49" charset="0"/>
-                <a:cs typeface="Courier New" panose="02070309020205020404" pitchFamily="49" charset="0"/>
-              </a:rPr>
-              <a:t>sum</a:t>
-            </a:r>
+              <a:t>)</a:t>
+            </a:r>
+            <a:endParaRPr lang="en-US" dirty="0" smtClean="0">
+              <a:latin typeface="Courier New" panose="02070309020205020404" pitchFamily="49" charset="0"/>
+              <a:cs typeface="Courier New" panose="02070309020205020404" pitchFamily="49" charset="0"/>
+            </a:endParaRPr>
+          </a:p>
+          <a:p>
             <a:r>
               <a:rPr lang="en-US" dirty="0" smtClean="0">
                 <a:latin typeface="Courier New" panose="02070309020205020404" pitchFamily="49" charset="0"/>
                 <a:cs typeface="Courier New" panose="02070309020205020404" pitchFamily="49" charset="0"/>
               </a:rPr>
-              <a:t>(</a:t>
-            </a:r>
-            <a:r>
-              <a:rPr lang="en-US" b="1" dirty="0">
-                <a:solidFill>
-                  <a:schemeClr val="accent1"/>
-                </a:solidFill>
-                <a:latin typeface="Courier New" panose="02070309020205020404" pitchFamily="49" charset="0"/>
-                <a:cs typeface="Courier New" panose="02070309020205020404" pitchFamily="49" charset="0"/>
-              </a:rPr>
-              <a:t>"count</a:t>
-            </a:r>
-            <a:r>
-              <a:rPr lang="en-US" b="1" dirty="0" smtClean="0">
-                <a:solidFill>
-                  <a:schemeClr val="accent1"/>
-                </a:solidFill>
-                <a:latin typeface="Courier New" panose="02070309020205020404" pitchFamily="49" charset="0"/>
-                <a:cs typeface="Courier New" panose="02070309020205020404" pitchFamily="49" charset="0"/>
-              </a:rPr>
-              <a:t>"</a:t>
-            </a:r>
-            <a:r>
-              <a:rPr lang="en-US" dirty="0">
-                <a:latin typeface="Courier New" panose="02070309020205020404" pitchFamily="49" charset="0"/>
-                <a:cs typeface="Courier New" panose="02070309020205020404" pitchFamily="49" charset="0"/>
-              </a:rPr>
-              <a:t>)</a:t>
-            </a:r>
-          </a:p>
-          <a:p>
+              <a:t>     </a:t>
+            </a:r>
             <a:r>
               <a:rPr lang="en-US" dirty="0" smtClean="0">
                 <a:latin typeface="Courier New" panose="02070309020205020404" pitchFamily="49" charset="0"/>
                 <a:cs typeface="Courier New" panose="02070309020205020404" pitchFamily="49" charset="0"/>
               </a:rPr>
-              <a:t>     .print()</a:t>
+              <a:t>.print()</a:t>
             </a:r>
           </a:p>
         </p:txBody>

</xml_diff>